<commit_message>
Various updates/additions to DB
Updates to exercises, addition of solutions
</commit_message>
<xml_diff>
--- a/Chap/DB/Presentations/DomainModels.pptx
+++ b/Chap/DB/Presentations/DomainModels.pptx
@@ -110,6 +110,11 @@
       </a:defRPr>
     </a:lvl9pPr>
   </p:defaultTextStyle>
+  <p:extLst>
+    <p:ext uri="{EFAFB233-063F-42B5-8137-9DF3F51BA10A}">
+      <p15:sldGuideLst xmlns:p15="http://schemas.microsoft.com/office/powerpoint/2012/main"/>
+    </p:ext>
+  </p:extLst>
 </p:presentation>
 </file>
 
@@ -244,7 +249,7 @@
           <a:p>
             <a:fld id="{85E35D86-2A90-4BD4-B74B-134833D2E49F}" type="datetimeFigureOut">
               <a:rPr lang="da-DK" smtClean="0"/>
-              <a:t>28-09-2018</a:t>
+              <a:t>09-10-2018</a:t>
             </a:fld>
             <a:endParaRPr lang="da-DK"/>
           </a:p>
@@ -414,7 +419,7 @@
           <a:p>
             <a:fld id="{85E35D86-2A90-4BD4-B74B-134833D2E49F}" type="datetimeFigureOut">
               <a:rPr lang="da-DK" smtClean="0"/>
-              <a:t>28-09-2018</a:t>
+              <a:t>09-10-2018</a:t>
             </a:fld>
             <a:endParaRPr lang="da-DK"/>
           </a:p>
@@ -594,7 +599,7 @@
           <a:p>
             <a:fld id="{85E35D86-2A90-4BD4-B74B-134833D2E49F}" type="datetimeFigureOut">
               <a:rPr lang="da-DK" smtClean="0"/>
-              <a:t>28-09-2018</a:t>
+              <a:t>09-10-2018</a:t>
             </a:fld>
             <a:endParaRPr lang="da-DK"/>
           </a:p>
@@ -764,7 +769,7 @@
           <a:p>
             <a:fld id="{85E35D86-2A90-4BD4-B74B-134833D2E49F}" type="datetimeFigureOut">
               <a:rPr lang="da-DK" smtClean="0"/>
-              <a:t>28-09-2018</a:t>
+              <a:t>09-10-2018</a:t>
             </a:fld>
             <a:endParaRPr lang="da-DK"/>
           </a:p>
@@ -1010,7 +1015,7 @@
           <a:p>
             <a:fld id="{85E35D86-2A90-4BD4-B74B-134833D2E49F}" type="datetimeFigureOut">
               <a:rPr lang="da-DK" smtClean="0"/>
-              <a:t>28-09-2018</a:t>
+              <a:t>09-10-2018</a:t>
             </a:fld>
             <a:endParaRPr lang="da-DK"/>
           </a:p>
@@ -1242,7 +1247,7 @@
           <a:p>
             <a:fld id="{85E35D86-2A90-4BD4-B74B-134833D2E49F}" type="datetimeFigureOut">
               <a:rPr lang="da-DK" smtClean="0"/>
-              <a:t>28-09-2018</a:t>
+              <a:t>09-10-2018</a:t>
             </a:fld>
             <a:endParaRPr lang="da-DK"/>
           </a:p>
@@ -1609,7 +1614,7 @@
           <a:p>
             <a:fld id="{85E35D86-2A90-4BD4-B74B-134833D2E49F}" type="datetimeFigureOut">
               <a:rPr lang="da-DK" smtClean="0"/>
-              <a:t>28-09-2018</a:t>
+              <a:t>09-10-2018</a:t>
             </a:fld>
             <a:endParaRPr lang="da-DK"/>
           </a:p>
@@ -1727,7 +1732,7 @@
           <a:p>
             <a:fld id="{85E35D86-2A90-4BD4-B74B-134833D2E49F}" type="datetimeFigureOut">
               <a:rPr lang="da-DK" smtClean="0"/>
-              <a:t>28-09-2018</a:t>
+              <a:t>09-10-2018</a:t>
             </a:fld>
             <a:endParaRPr lang="da-DK"/>
           </a:p>
@@ -1822,7 +1827,7 @@
           <a:p>
             <a:fld id="{85E35D86-2A90-4BD4-B74B-134833D2E49F}" type="datetimeFigureOut">
               <a:rPr lang="da-DK" smtClean="0"/>
-              <a:t>28-09-2018</a:t>
+              <a:t>09-10-2018</a:t>
             </a:fld>
             <a:endParaRPr lang="da-DK"/>
           </a:p>
@@ -2099,7 +2104,7 @@
           <a:p>
             <a:fld id="{85E35D86-2A90-4BD4-B74B-134833D2E49F}" type="datetimeFigureOut">
               <a:rPr lang="da-DK" smtClean="0"/>
-              <a:t>28-09-2018</a:t>
+              <a:t>09-10-2018</a:t>
             </a:fld>
             <a:endParaRPr lang="da-DK"/>
           </a:p>
@@ -2352,7 +2357,7 @@
           <a:p>
             <a:fld id="{85E35D86-2A90-4BD4-B74B-134833D2E49F}" type="datetimeFigureOut">
               <a:rPr lang="da-DK" smtClean="0"/>
-              <a:t>28-09-2018</a:t>
+              <a:t>09-10-2018</a:t>
             </a:fld>
             <a:endParaRPr lang="da-DK"/>
           </a:p>
@@ -2565,7 +2570,7 @@
           <a:p>
             <a:fld id="{85E35D86-2A90-4BD4-B74B-134833D2E49F}" type="datetimeFigureOut">
               <a:rPr lang="da-DK" smtClean="0"/>
-              <a:t>28-09-2018</a:t>
+              <a:t>09-10-2018</a:t>
             </a:fld>
             <a:endParaRPr lang="da-DK"/>
           </a:p>
@@ -3154,11 +3159,7 @@
           <a:p>
             <a:r>
               <a:rPr lang="da-DK" sz="1400" b="1" smtClean="0"/>
-              <a:t>0</a:t>
-            </a:r>
-            <a:r>
-              <a:rPr lang="da-DK" sz="1400" b="1" smtClean="0"/>
-              <a:t>..1</a:t>
+              <a:t>0..1</a:t>
             </a:r>
             <a:endParaRPr lang="da-DK" sz="1400" b="1"/>
           </a:p>
@@ -3258,11 +3259,7 @@
           <a:p>
             <a:r>
               <a:rPr lang="da-DK" sz="1400" b="1" smtClean="0"/>
-              <a:t>0</a:t>
-            </a:r>
-            <a:r>
-              <a:rPr lang="da-DK" sz="1400" b="1" smtClean="0"/>
-              <a:t>..1</a:t>
+              <a:t>0..1</a:t>
             </a:r>
             <a:endParaRPr lang="da-DK" sz="1400" b="1"/>
           </a:p>
@@ -3320,50 +3317,89 @@
           </a:p>
           <a:p>
             <a:r>
+              <a:rPr lang="da-DK" sz="1400"/>
+              <a:t>N</a:t>
+            </a:r>
+            <a:r>
               <a:rPr lang="da-DK" sz="1400" smtClean="0"/>
-              <a:t>name</a:t>
-            </a:r>
-          </a:p>
-          <a:p>
+              <a:t>ame</a:t>
+            </a:r>
+            <a:endParaRPr lang="da-DK" sz="1400" smtClean="0"/>
+          </a:p>
+          <a:p>
+            <a:r>
+              <a:rPr lang="da-DK" sz="1400"/>
+              <a:t>T</a:t>
+            </a:r>
             <a:r>
               <a:rPr lang="da-DK" sz="1400" smtClean="0"/>
-              <a:t>type</a:t>
-            </a:r>
-          </a:p>
-          <a:p>
+              <a:t>ype</a:t>
+            </a:r>
+            <a:endParaRPr lang="da-DK" sz="1400" smtClean="0"/>
+          </a:p>
+          <a:p>
+            <a:r>
+              <a:rPr lang="da-DK" sz="1400"/>
+              <a:t>R</a:t>
+            </a:r>
             <a:r>
               <a:rPr lang="da-DK" sz="1400" smtClean="0"/>
-              <a:t>rarity</a:t>
-            </a:r>
+              <a:t>arity</a:t>
+            </a:r>
+            <a:endParaRPr lang="da-DK" sz="1400" smtClean="0"/>
           </a:p>
           <a:p>
             <a:r>
               <a:rPr lang="da-DK" sz="1400" smtClean="0"/>
-              <a:t>item_level</a:t>
-            </a:r>
-          </a:p>
-          <a:p>
+              <a:t>I</a:t>
+            </a:r>
             <a:r>
               <a:rPr lang="da-DK" sz="1400" smtClean="0"/>
-              <a:t>jewel_sockets</a:t>
-            </a:r>
+              <a:t>temLevel</a:t>
+            </a:r>
+            <a:endParaRPr lang="da-DK" sz="1400" smtClean="0"/>
           </a:p>
           <a:p>
             <a:r>
               <a:rPr lang="da-DK" sz="1400" smtClean="0"/>
-              <a:t>min_damage</a:t>
-            </a:r>
-          </a:p>
-          <a:p>
+              <a:t>J</a:t>
+            </a:r>
             <a:r>
               <a:rPr lang="da-DK" sz="1400" smtClean="0"/>
-              <a:t>max_damage</a:t>
-            </a:r>
+              <a:t>ewelSockets</a:t>
+            </a:r>
+            <a:endParaRPr lang="da-DK" sz="1400" smtClean="0"/>
           </a:p>
           <a:p>
             <a:r>
               <a:rPr lang="da-DK" sz="1400" smtClean="0"/>
-              <a:t>two_handed</a:t>
+              <a:t>M</a:t>
+            </a:r>
+            <a:r>
+              <a:rPr lang="da-DK" sz="1400" smtClean="0"/>
+              <a:t>inDamage</a:t>
+            </a:r>
+            <a:endParaRPr lang="da-DK" sz="1400" smtClean="0"/>
+          </a:p>
+          <a:p>
+            <a:r>
+              <a:rPr lang="da-DK" sz="1400" smtClean="0"/>
+              <a:t>M</a:t>
+            </a:r>
+            <a:r>
+              <a:rPr lang="da-DK" sz="1400" smtClean="0"/>
+              <a:t>axDamage</a:t>
+            </a:r>
+            <a:endParaRPr lang="da-DK" sz="1400" smtClean="0"/>
+          </a:p>
+          <a:p>
+            <a:r>
+              <a:rPr lang="da-DK" sz="1400"/>
+              <a:t>T</a:t>
+            </a:r>
+            <a:r>
+              <a:rPr lang="da-DK" sz="1400" smtClean="0"/>
+              <a:t>woHanded</a:t>
             </a:r>
             <a:endParaRPr lang="da-DK" sz="1400"/>
           </a:p>
@@ -3416,34 +3452,48 @@
               </a:rPr>
               <a:t>Character</a:t>
             </a:r>
-            <a:endParaRPr lang="da-DK" smtClean="0">
-              <a:solidFill>
-                <a:srgbClr val="FFFF00"/>
-              </a:solidFill>
-            </a:endParaRPr>
-          </a:p>
-          <a:p>
+          </a:p>
+          <a:p>
+            <a:r>
+              <a:rPr lang="da-DK" sz="1400"/>
+              <a:t>N</a:t>
+            </a:r>
             <a:r>
               <a:rPr lang="da-DK" sz="1400" smtClean="0"/>
-              <a:t>name</a:t>
-            </a:r>
-          </a:p>
-          <a:p>
+              <a:t>ame</a:t>
+            </a:r>
+            <a:endParaRPr lang="da-DK" sz="1400" smtClean="0"/>
+          </a:p>
+          <a:p>
+            <a:r>
+              <a:rPr lang="da-DK" sz="1400"/>
+              <a:t>R</a:t>
+            </a:r>
             <a:r>
               <a:rPr lang="da-DK" sz="1400" smtClean="0"/>
-              <a:t>race</a:t>
-            </a:r>
-          </a:p>
-          <a:p>
+              <a:t>ace</a:t>
+            </a:r>
+            <a:endParaRPr lang="da-DK" sz="1400" smtClean="0"/>
+          </a:p>
+          <a:p>
+            <a:r>
+              <a:rPr lang="da-DK" sz="1400"/>
+              <a:t>C</a:t>
+            </a:r>
             <a:r>
               <a:rPr lang="da-DK" sz="1400" smtClean="0"/>
-              <a:t>class</a:t>
-            </a:r>
+              <a:t>lass</a:t>
+            </a:r>
+            <a:endParaRPr lang="da-DK" sz="1400" smtClean="0"/>
           </a:p>
           <a:p>
             <a:r>
               <a:rPr lang="da-DK" sz="1400" smtClean="0"/>
-              <a:t>health_points</a:t>
+              <a:t>H</a:t>
+            </a:r>
+            <a:r>
+              <a:rPr lang="da-DK" sz="1400" smtClean="0"/>
+              <a:t>ealthPoints</a:t>
             </a:r>
             <a:endParaRPr lang="da-DK" sz="1400"/>
           </a:p>
@@ -3473,11 +3523,7 @@
           <a:p>
             <a:r>
               <a:rPr lang="da-DK" sz="1400" b="1" smtClean="0"/>
-              <a:t>0</a:t>
-            </a:r>
-            <a:r>
-              <a:rPr lang="da-DK" sz="1400" b="1" smtClean="0"/>
-              <a:t>..*</a:t>
+              <a:t>0..*</a:t>
             </a:r>
             <a:endParaRPr lang="da-DK" sz="1400" b="1"/>
           </a:p>
@@ -3507,13 +3553,39 @@
           <a:p>
             <a:r>
               <a:rPr lang="da-DK" sz="1400" b="1" smtClean="0"/>
-              <a:t>0</a:t>
-            </a:r>
-            <a:r>
-              <a:rPr lang="da-DK" sz="1400" b="1" smtClean="0"/>
-              <a:t>..*</a:t>
+              <a:t>0..*</a:t>
             </a:r>
             <a:endParaRPr lang="da-DK" sz="1400" b="1"/>
+          </a:p>
+        </p:txBody>
+      </p:sp>
+      <p:sp>
+        <p:nvSpPr>
+          <p:cNvPr id="2" name="Tekstfelt 1"/>
+          <p:cNvSpPr txBox="1"/>
+          <p:nvPr/>
+        </p:nvSpPr>
+        <p:spPr>
+          <a:xfrm>
+            <a:off x="10467474" y="5751094"/>
+            <a:ext cx="1258678" cy="369332"/>
+          </a:xfrm>
+          <a:prstGeom prst="rect">
+            <a:avLst/>
+          </a:prstGeom>
+          <a:noFill/>
+        </p:spPr>
+        <p:txBody>
+          <a:bodyPr wrap="none" rtlCol="0">
+            <a:spAutoFit/>
+          </a:bodyPr>
+          <a:lstStyle/>
+          <a:p>
+            <a:r>
+              <a:rPr lang="da-DK" smtClean="0"/>
+              <a:t>DBDesign.1</a:t>
+            </a:r>
+            <a:endParaRPr lang="da-DK"/>
           </a:p>
         </p:txBody>
       </p:sp>
@@ -3648,11 +3720,7 @@
           <a:p>
             <a:r>
               <a:rPr lang="da-DK" sz="1400" b="1" smtClean="0"/>
-              <a:t>0</a:t>
-            </a:r>
-            <a:r>
-              <a:rPr lang="da-DK" sz="1400" b="1" smtClean="0"/>
-              <a:t>..1</a:t>
+              <a:t>0..1</a:t>
             </a:r>
             <a:endParaRPr lang="da-DK" sz="1400" b="1"/>
           </a:p>
@@ -3752,11 +3820,7 @@
           <a:p>
             <a:r>
               <a:rPr lang="da-DK" sz="1400" b="1" smtClean="0"/>
-              <a:t>0</a:t>
-            </a:r>
-            <a:r>
-              <a:rPr lang="da-DK" sz="1400" b="1" smtClean="0"/>
-              <a:t>..1</a:t>
+              <a:t>0..1</a:t>
             </a:r>
             <a:endParaRPr lang="da-DK" sz="1400" b="1"/>
           </a:p>
@@ -3809,34 +3873,29 @@
               </a:rPr>
               <a:t>Character</a:t>
             </a:r>
-            <a:endParaRPr lang="da-DK" smtClean="0">
-              <a:solidFill>
-                <a:srgbClr val="FFFF00"/>
-              </a:solidFill>
-            </a:endParaRPr>
-          </a:p>
-          <a:p>
-            <a:r>
-              <a:rPr lang="da-DK" sz="1400" smtClean="0"/>
-              <a:t>name</a:t>
-            </a:r>
-          </a:p>
-          <a:p>
-            <a:r>
-              <a:rPr lang="da-DK" sz="1400" smtClean="0"/>
-              <a:t>race</a:t>
-            </a:r>
-          </a:p>
-          <a:p>
-            <a:r>
-              <a:rPr lang="da-DK" sz="1400" smtClean="0"/>
-              <a:t>class</a:t>
-            </a:r>
-          </a:p>
-          <a:p>
-            <a:r>
-              <a:rPr lang="da-DK" sz="1400" smtClean="0"/>
-              <a:t>health_points</a:t>
+          </a:p>
+          <a:p>
+            <a:r>
+              <a:rPr lang="da-DK" sz="1400"/>
+              <a:t>Name</a:t>
+            </a:r>
+          </a:p>
+          <a:p>
+            <a:r>
+              <a:rPr lang="da-DK" sz="1400"/>
+              <a:t>Race</a:t>
+            </a:r>
+          </a:p>
+          <a:p>
+            <a:r>
+              <a:rPr lang="da-DK" sz="1400"/>
+              <a:t>Class</a:t>
+            </a:r>
+          </a:p>
+          <a:p>
+            <a:r>
+              <a:rPr lang="da-DK" sz="1400"/>
+              <a:t>HealthPoints</a:t>
             </a:r>
             <a:endParaRPr lang="da-DK" sz="1400"/>
           </a:p>
@@ -3996,11 +4055,7 @@
           <a:p>
             <a:r>
               <a:rPr lang="da-DK" sz="1400" b="1" smtClean="0"/>
-              <a:t>0</a:t>
-            </a:r>
-            <a:r>
-              <a:rPr lang="da-DK" sz="1400" b="1" smtClean="0"/>
-              <a:t>..*</a:t>
+              <a:t>0..*</a:t>
             </a:r>
             <a:endParaRPr lang="da-DK" sz="1400" b="1"/>
           </a:p>
@@ -4056,50 +4111,50 @@
           </a:p>
           <a:p>
             <a:r>
-              <a:rPr lang="da-DK" sz="1400" smtClean="0"/>
-              <a:t>name</a:t>
-            </a:r>
-          </a:p>
-          <a:p>
-            <a:r>
-              <a:rPr lang="da-DK" sz="1400" smtClean="0"/>
-              <a:t>type</a:t>
-            </a:r>
-          </a:p>
-          <a:p>
-            <a:r>
-              <a:rPr lang="da-DK" sz="1400" smtClean="0"/>
-              <a:t>rarity</a:t>
-            </a:r>
-          </a:p>
-          <a:p>
-            <a:r>
-              <a:rPr lang="da-DK" sz="1400" smtClean="0"/>
-              <a:t>item_level</a:t>
-            </a:r>
-          </a:p>
-          <a:p>
-            <a:r>
-              <a:rPr lang="da-DK" sz="1400" smtClean="0"/>
-              <a:t>jewel_sockets</a:t>
-            </a:r>
-          </a:p>
-          <a:p>
-            <a:r>
-              <a:rPr lang="da-DK" sz="1400" smtClean="0"/>
-              <a:t>min_damage</a:t>
-            </a:r>
-          </a:p>
-          <a:p>
-            <a:r>
-              <a:rPr lang="da-DK" sz="1400" smtClean="0"/>
-              <a:t>max_damage</a:t>
-            </a:r>
-          </a:p>
-          <a:p>
-            <a:r>
-              <a:rPr lang="da-DK" sz="1400" smtClean="0"/>
-              <a:t>two_handed</a:t>
+              <a:rPr lang="da-DK" sz="1400"/>
+              <a:t>Name</a:t>
+            </a:r>
+          </a:p>
+          <a:p>
+            <a:r>
+              <a:rPr lang="da-DK" sz="1400"/>
+              <a:t>Type</a:t>
+            </a:r>
+          </a:p>
+          <a:p>
+            <a:r>
+              <a:rPr lang="da-DK" sz="1400"/>
+              <a:t>Rarity</a:t>
+            </a:r>
+          </a:p>
+          <a:p>
+            <a:r>
+              <a:rPr lang="da-DK" sz="1400"/>
+              <a:t>ItemLevel</a:t>
+            </a:r>
+          </a:p>
+          <a:p>
+            <a:r>
+              <a:rPr lang="da-DK" sz="1400"/>
+              <a:t>JewelSockets</a:t>
+            </a:r>
+          </a:p>
+          <a:p>
+            <a:r>
+              <a:rPr lang="da-DK" sz="1400"/>
+              <a:t>MinDamage</a:t>
+            </a:r>
+          </a:p>
+          <a:p>
+            <a:r>
+              <a:rPr lang="da-DK" sz="1400"/>
+              <a:t>MaxDamage</a:t>
+            </a:r>
+          </a:p>
+          <a:p>
+            <a:r>
+              <a:rPr lang="da-DK" sz="1400"/>
+              <a:t>TwoHanded</a:t>
             </a:r>
             <a:endParaRPr lang="da-DK" sz="1400"/>
           </a:p>
@@ -4184,6 +4239,36 @@
               <a:t>0..1</a:t>
             </a:r>
             <a:endParaRPr lang="da-DK" sz="1400" b="1"/>
+          </a:p>
+        </p:txBody>
+      </p:sp>
+      <p:sp>
+        <p:nvSpPr>
+          <p:cNvPr id="19" name="Tekstfelt 18"/>
+          <p:cNvSpPr txBox="1"/>
+          <p:nvPr/>
+        </p:nvSpPr>
+        <p:spPr>
+          <a:xfrm>
+            <a:off x="10467474" y="5751094"/>
+            <a:ext cx="1258678" cy="369332"/>
+          </a:xfrm>
+          <a:prstGeom prst="rect">
+            <a:avLst/>
+          </a:prstGeom>
+          <a:noFill/>
+        </p:spPr>
+        <p:txBody>
+          <a:bodyPr wrap="none" rtlCol="0">
+            <a:spAutoFit/>
+          </a:bodyPr>
+          <a:lstStyle/>
+          <a:p>
+            <a:r>
+              <a:rPr lang="da-DK" smtClean="0"/>
+              <a:t>DBDesign.2</a:t>
+            </a:r>
+            <a:endParaRPr lang="da-DK"/>
           </a:p>
         </p:txBody>
       </p:sp>
@@ -4318,11 +4403,7 @@
           <a:p>
             <a:r>
               <a:rPr lang="da-DK" sz="1400" b="1" smtClean="0"/>
-              <a:t>0</a:t>
-            </a:r>
-            <a:r>
-              <a:rPr lang="da-DK" sz="1400" b="1" smtClean="0"/>
-              <a:t>..1</a:t>
+              <a:t>0..1</a:t>
             </a:r>
             <a:endParaRPr lang="da-DK" sz="1400" b="1"/>
           </a:p>
@@ -4422,11 +4503,7 @@
           <a:p>
             <a:r>
               <a:rPr lang="da-DK" sz="1400" b="1" smtClean="0"/>
-              <a:t>0</a:t>
-            </a:r>
-            <a:r>
-              <a:rPr lang="da-DK" sz="1400" b="1" smtClean="0"/>
-              <a:t>..1</a:t>
+              <a:t>0..1</a:t>
             </a:r>
             <a:endParaRPr lang="da-DK" sz="1400" b="1"/>
           </a:p>
@@ -4586,11 +4663,7 @@
           <a:p>
             <a:r>
               <a:rPr lang="da-DK" sz="1400" b="1" smtClean="0"/>
-              <a:t>0</a:t>
-            </a:r>
-            <a:r>
-              <a:rPr lang="da-DK" sz="1400" b="1" smtClean="0"/>
-              <a:t>..*</a:t>
+              <a:t>0..*</a:t>
             </a:r>
             <a:endParaRPr lang="da-DK" sz="1400" b="1"/>
           </a:p>
@@ -4674,25 +4747,6 @@
               <a:t>Jewel</a:t>
             </a:r>
           </a:p>
-          <a:p>
-            <a:r>
-              <a:rPr lang="da-DK" sz="1400" smtClean="0"/>
-              <a:t>name</a:t>
-            </a:r>
-            <a:endParaRPr lang="da-DK" sz="1400" smtClean="0"/>
-          </a:p>
-          <a:p>
-            <a:r>
-              <a:rPr lang="da-DK" sz="1400" smtClean="0"/>
-              <a:t>rarity</a:t>
-            </a:r>
-          </a:p>
-          <a:p>
-            <a:r>
-              <a:rPr lang="da-DK" sz="1400" smtClean="0"/>
-              <a:t>added_damage</a:t>
-            </a:r>
-          </a:p>
         </p:txBody>
       </p:sp>
       <p:cxnSp>
@@ -4819,11 +4873,7 @@
           <a:p>
             <a:r>
               <a:rPr lang="da-DK" sz="1400" b="1" smtClean="0"/>
-              <a:t>0</a:t>
-            </a:r>
-            <a:r>
-              <a:rPr lang="da-DK" sz="1400" b="1" smtClean="0"/>
-              <a:t>..*</a:t>
+              <a:t>0..*</a:t>
             </a:r>
             <a:endParaRPr lang="da-DK" sz="1400" b="1"/>
           </a:p>
@@ -4930,11 +4980,7 @@
           <a:p>
             <a:r>
               <a:rPr lang="da-DK" sz="1400" b="1" smtClean="0"/>
-              <a:t>0</a:t>
-            </a:r>
-            <a:r>
-              <a:rPr lang="da-DK" sz="1400" b="1" smtClean="0"/>
-              <a:t>..1</a:t>
+              <a:t>0..1</a:t>
             </a:r>
             <a:endParaRPr lang="da-DK" sz="1400" b="1"/>
           </a:p>
@@ -4964,11 +5010,7 @@
           <a:p>
             <a:r>
               <a:rPr lang="da-DK" sz="1400" b="1" smtClean="0"/>
-              <a:t>0</a:t>
-            </a:r>
-            <a:r>
-              <a:rPr lang="da-DK" sz="1400" b="1" smtClean="0"/>
-              <a:t>..*</a:t>
+              <a:t>0..*</a:t>
             </a:r>
             <a:endParaRPr lang="da-DK" sz="1400" b="1"/>
           </a:p>
@@ -5024,22 +5066,36 @@
           </a:p>
           <a:p>
             <a:r>
+              <a:rPr lang="da-DK" sz="1400"/>
+              <a:t>N</a:t>
+            </a:r>
+            <a:r>
               <a:rPr lang="da-DK" sz="1400" smtClean="0"/>
-              <a:t>name</a:t>
+              <a:t>ame</a:t>
             </a:r>
             <a:endParaRPr lang="da-DK" sz="1400" smtClean="0"/>
           </a:p>
           <a:p>
             <a:r>
+              <a:rPr lang="da-DK" sz="1400"/>
+              <a:t>R</a:t>
+            </a:r>
+            <a:r>
               <a:rPr lang="da-DK" sz="1400" smtClean="0"/>
-              <a:t>rarity</a:t>
-            </a:r>
+              <a:t>arity</a:t>
+            </a:r>
+            <a:endParaRPr lang="da-DK" sz="1400" smtClean="0"/>
           </a:p>
           <a:p>
             <a:r>
               <a:rPr lang="da-DK" sz="1400" smtClean="0"/>
-              <a:t>added_damage</a:t>
-            </a:r>
+              <a:t>A</a:t>
+            </a:r>
+            <a:r>
+              <a:rPr lang="da-DK" sz="1400" smtClean="0"/>
+              <a:t>ddedDamage</a:t>
+            </a:r>
+            <a:endParaRPr lang="da-DK" sz="1400" smtClean="0"/>
           </a:p>
         </p:txBody>
       </p:sp>
@@ -5093,50 +5149,50 @@
           </a:p>
           <a:p>
             <a:r>
-              <a:rPr lang="da-DK" sz="1400" smtClean="0"/>
-              <a:t>name</a:t>
-            </a:r>
-          </a:p>
-          <a:p>
-            <a:r>
-              <a:rPr lang="da-DK" sz="1400" smtClean="0"/>
-              <a:t>type</a:t>
-            </a:r>
-          </a:p>
-          <a:p>
-            <a:r>
-              <a:rPr lang="da-DK" sz="1400" smtClean="0"/>
-              <a:t>rarity</a:t>
-            </a:r>
-          </a:p>
-          <a:p>
-            <a:r>
-              <a:rPr lang="da-DK" sz="1400" smtClean="0"/>
-              <a:t>item_level</a:t>
-            </a:r>
-          </a:p>
-          <a:p>
-            <a:r>
-              <a:rPr lang="da-DK" sz="1400" smtClean="0"/>
-              <a:t>jewel_sockets</a:t>
-            </a:r>
-          </a:p>
-          <a:p>
-            <a:r>
-              <a:rPr lang="da-DK" sz="1400" smtClean="0"/>
-              <a:t>min_damage</a:t>
-            </a:r>
-          </a:p>
-          <a:p>
-            <a:r>
-              <a:rPr lang="da-DK" sz="1400" smtClean="0"/>
-              <a:t>max_damage</a:t>
-            </a:r>
-          </a:p>
-          <a:p>
-            <a:r>
-              <a:rPr lang="da-DK" sz="1400" smtClean="0"/>
-              <a:t>two_handed</a:t>
+              <a:rPr lang="da-DK" sz="1400"/>
+              <a:t>Name</a:t>
+            </a:r>
+          </a:p>
+          <a:p>
+            <a:r>
+              <a:rPr lang="da-DK" sz="1400"/>
+              <a:t>Type</a:t>
+            </a:r>
+          </a:p>
+          <a:p>
+            <a:r>
+              <a:rPr lang="da-DK" sz="1400"/>
+              <a:t>Rarity</a:t>
+            </a:r>
+          </a:p>
+          <a:p>
+            <a:r>
+              <a:rPr lang="da-DK" sz="1400"/>
+              <a:t>ItemLevel</a:t>
+            </a:r>
+          </a:p>
+          <a:p>
+            <a:r>
+              <a:rPr lang="da-DK" sz="1400"/>
+              <a:t>JewelSockets</a:t>
+            </a:r>
+          </a:p>
+          <a:p>
+            <a:r>
+              <a:rPr lang="da-DK" sz="1400"/>
+              <a:t>MinDamage</a:t>
+            </a:r>
+          </a:p>
+          <a:p>
+            <a:r>
+              <a:rPr lang="da-DK" sz="1400"/>
+              <a:t>MaxDamage</a:t>
+            </a:r>
+          </a:p>
+          <a:p>
+            <a:r>
+              <a:rPr lang="da-DK" sz="1400"/>
+              <a:t>TwoHanded</a:t>
             </a:r>
             <a:endParaRPr lang="da-DK" sz="1400"/>
           </a:p>
@@ -5189,34 +5245,29 @@
               </a:rPr>
               <a:t>Character</a:t>
             </a:r>
-            <a:endParaRPr lang="da-DK" smtClean="0">
-              <a:solidFill>
-                <a:srgbClr val="FFFF00"/>
-              </a:solidFill>
-            </a:endParaRPr>
-          </a:p>
-          <a:p>
-            <a:r>
-              <a:rPr lang="da-DK" sz="1400" smtClean="0"/>
-              <a:t>name</a:t>
-            </a:r>
-          </a:p>
-          <a:p>
-            <a:r>
-              <a:rPr lang="da-DK" sz="1400" smtClean="0"/>
-              <a:t>race</a:t>
-            </a:r>
-          </a:p>
-          <a:p>
-            <a:r>
-              <a:rPr lang="da-DK" sz="1400" smtClean="0"/>
-              <a:t>class</a:t>
-            </a:r>
-          </a:p>
-          <a:p>
-            <a:r>
-              <a:rPr lang="da-DK" sz="1400" smtClean="0"/>
-              <a:t>health_points</a:t>
+          </a:p>
+          <a:p>
+            <a:r>
+              <a:rPr lang="da-DK" sz="1400"/>
+              <a:t>Name</a:t>
+            </a:r>
+          </a:p>
+          <a:p>
+            <a:r>
+              <a:rPr lang="da-DK" sz="1400"/>
+              <a:t>Race</a:t>
+            </a:r>
+          </a:p>
+          <a:p>
+            <a:r>
+              <a:rPr lang="da-DK" sz="1400"/>
+              <a:t>Class</a:t>
+            </a:r>
+          </a:p>
+          <a:p>
+            <a:r>
+              <a:rPr lang="da-DK" sz="1400"/>
+              <a:t>HealthPoints</a:t>
             </a:r>
             <a:endParaRPr lang="da-DK" sz="1400"/>
           </a:p>
@@ -5271,6 +5322,36 @@
               </a:rPr>
               <a:t>Weapon</a:t>
             </a:r>
+          </a:p>
+        </p:txBody>
+      </p:sp>
+      <p:sp>
+        <p:nvSpPr>
+          <p:cNvPr id="32" name="Tekstfelt 31"/>
+          <p:cNvSpPr txBox="1"/>
+          <p:nvPr/>
+        </p:nvSpPr>
+        <p:spPr>
+          <a:xfrm>
+            <a:off x="10467474" y="5751094"/>
+            <a:ext cx="1258678" cy="369332"/>
+          </a:xfrm>
+          <a:prstGeom prst="rect">
+            <a:avLst/>
+          </a:prstGeom>
+          <a:noFill/>
+        </p:spPr>
+        <p:txBody>
+          <a:bodyPr wrap="none" rtlCol="0">
+            <a:spAutoFit/>
+          </a:bodyPr>
+          <a:lstStyle/>
+          <a:p>
+            <a:r>
+              <a:rPr lang="da-DK" smtClean="0"/>
+              <a:t>DBDesign.3</a:t>
+            </a:r>
+            <a:endParaRPr lang="da-DK"/>
           </a:p>
         </p:txBody>
       </p:sp>
@@ -5405,11 +5486,7 @@
           <a:p>
             <a:r>
               <a:rPr lang="da-DK" sz="1400" b="1" smtClean="0"/>
-              <a:t>0</a:t>
-            </a:r>
-            <a:r>
-              <a:rPr lang="da-DK" sz="1400" b="1" smtClean="0"/>
-              <a:t>..1</a:t>
+              <a:t>0..1</a:t>
             </a:r>
             <a:endParaRPr lang="da-DK" sz="1400" b="1"/>
           </a:p>
@@ -5509,11 +5586,7 @@
           <a:p>
             <a:r>
               <a:rPr lang="da-DK" sz="1400" b="1" smtClean="0"/>
-              <a:t>0</a:t>
-            </a:r>
-            <a:r>
-              <a:rPr lang="da-DK" sz="1400" b="1" smtClean="0"/>
-              <a:t>..1</a:t>
+              <a:t>0..1</a:t>
             </a:r>
             <a:endParaRPr lang="da-DK" sz="1400" b="1"/>
           </a:p>
@@ -5673,11 +5746,7 @@
           <a:p>
             <a:r>
               <a:rPr lang="da-DK" sz="1400" b="1" smtClean="0"/>
-              <a:t>0</a:t>
-            </a:r>
-            <a:r>
-              <a:rPr lang="da-DK" sz="1400" b="1" smtClean="0"/>
-              <a:t>..*</a:t>
+              <a:t>0..*</a:t>
             </a:r>
             <a:endParaRPr lang="da-DK" sz="1400" b="1"/>
           </a:p>
@@ -5761,25 +5830,6 @@
               <a:t>Jewel</a:t>
             </a:r>
           </a:p>
-          <a:p>
-            <a:r>
-              <a:rPr lang="da-DK" sz="1400" smtClean="0"/>
-              <a:t>name</a:t>
-            </a:r>
-            <a:endParaRPr lang="da-DK" sz="1400" smtClean="0"/>
-          </a:p>
-          <a:p>
-            <a:r>
-              <a:rPr lang="da-DK" sz="1400" smtClean="0"/>
-              <a:t>rarity</a:t>
-            </a:r>
-          </a:p>
-          <a:p>
-            <a:r>
-              <a:rPr lang="da-DK" sz="1400" smtClean="0"/>
-              <a:t>added_damage</a:t>
-            </a:r>
-          </a:p>
         </p:txBody>
       </p:sp>
       <p:cxnSp>
@@ -5906,11 +5956,7 @@
           <a:p>
             <a:r>
               <a:rPr lang="da-DK" sz="1400" b="1" smtClean="0"/>
-              <a:t>0</a:t>
-            </a:r>
-            <a:r>
-              <a:rPr lang="da-DK" sz="1400" b="1" smtClean="0"/>
-              <a:t>..*</a:t>
+              <a:t>0..*</a:t>
             </a:r>
             <a:endParaRPr lang="da-DK" sz="1400" b="1"/>
           </a:p>
@@ -6017,11 +6063,7 @@
           <a:p>
             <a:r>
               <a:rPr lang="da-DK" sz="1400" b="1" smtClean="0"/>
-              <a:t>0</a:t>
-            </a:r>
-            <a:r>
-              <a:rPr lang="da-DK" sz="1400" b="1" smtClean="0"/>
-              <a:t>..1</a:t>
+              <a:t>0..1</a:t>
             </a:r>
             <a:endParaRPr lang="da-DK" sz="1400" b="1"/>
           </a:p>
@@ -6051,11 +6093,7 @@
           <a:p>
             <a:r>
               <a:rPr lang="da-DK" sz="1400" b="1" smtClean="0"/>
-              <a:t>0</a:t>
-            </a:r>
-            <a:r>
-              <a:rPr lang="da-DK" sz="1400" b="1" smtClean="0"/>
-              <a:t>..*</a:t>
+              <a:t>0..*</a:t>
             </a:r>
             <a:endParaRPr lang="da-DK" sz="1400" b="1"/>
           </a:p>
@@ -6146,11 +6184,7 @@
           <a:p>
             <a:r>
               <a:rPr lang="da-DK" sz="1400" b="1" smtClean="0"/>
-              <a:t>0</a:t>
-            </a:r>
-            <a:r>
-              <a:rPr lang="da-DK" sz="1400" b="1" smtClean="0"/>
-              <a:t>..*</a:t>
+              <a:t>0..*</a:t>
             </a:r>
             <a:endParaRPr lang="da-DK" sz="1400" b="1"/>
           </a:p>
@@ -6180,11 +6214,7 @@
           <a:p>
             <a:r>
               <a:rPr lang="da-DK" sz="1400" b="1" smtClean="0"/>
-              <a:t>0</a:t>
-            </a:r>
-            <a:r>
-              <a:rPr lang="da-DK" sz="1400" b="1" smtClean="0"/>
-              <a:t>..*</a:t>
+              <a:t>0..*</a:t>
             </a:r>
             <a:endParaRPr lang="da-DK" sz="1400" b="1"/>
           </a:p>
@@ -6240,21 +6270,20 @@
           </a:p>
           <a:p>
             <a:r>
-              <a:rPr lang="da-DK" sz="1400" smtClean="0"/>
-              <a:t>name</a:t>
-            </a:r>
-            <a:endParaRPr lang="da-DK" sz="1400" smtClean="0"/>
-          </a:p>
-          <a:p>
-            <a:r>
-              <a:rPr lang="da-DK" sz="1400" smtClean="0"/>
-              <a:t>rarity</a:t>
-            </a:r>
-          </a:p>
-          <a:p>
-            <a:r>
-              <a:rPr lang="da-DK" sz="1400" smtClean="0"/>
-              <a:t>added_damage</a:t>
+              <a:rPr lang="da-DK" sz="1400"/>
+              <a:t>Name</a:t>
+            </a:r>
+          </a:p>
+          <a:p>
+            <a:r>
+              <a:rPr lang="da-DK" sz="1400"/>
+              <a:t>Rarity</a:t>
+            </a:r>
+          </a:p>
+          <a:p>
+            <a:r>
+              <a:rPr lang="da-DK" sz="1400"/>
+              <a:t>AddedDamage</a:t>
             </a:r>
           </a:p>
         </p:txBody>
@@ -6309,50 +6338,50 @@
           </a:p>
           <a:p>
             <a:r>
-              <a:rPr lang="da-DK" sz="1400" smtClean="0"/>
-              <a:t>name</a:t>
-            </a:r>
-          </a:p>
-          <a:p>
-            <a:r>
-              <a:rPr lang="da-DK" sz="1400" smtClean="0"/>
-              <a:t>type</a:t>
-            </a:r>
-          </a:p>
-          <a:p>
-            <a:r>
-              <a:rPr lang="da-DK" sz="1400" smtClean="0"/>
-              <a:t>rarity</a:t>
-            </a:r>
-          </a:p>
-          <a:p>
-            <a:r>
-              <a:rPr lang="da-DK" sz="1400" smtClean="0"/>
-              <a:t>item_level</a:t>
-            </a:r>
-          </a:p>
-          <a:p>
-            <a:r>
-              <a:rPr lang="da-DK" sz="1400" smtClean="0"/>
-              <a:t>jewel_sockets</a:t>
-            </a:r>
-          </a:p>
-          <a:p>
-            <a:r>
-              <a:rPr lang="da-DK" sz="1400" smtClean="0"/>
-              <a:t>min_damage</a:t>
-            </a:r>
-          </a:p>
-          <a:p>
-            <a:r>
-              <a:rPr lang="da-DK" sz="1400" smtClean="0"/>
-              <a:t>max_damage</a:t>
-            </a:r>
-          </a:p>
-          <a:p>
-            <a:r>
-              <a:rPr lang="da-DK" sz="1400" smtClean="0"/>
-              <a:t>two_handed</a:t>
+              <a:rPr lang="da-DK" sz="1400"/>
+              <a:t>Name</a:t>
+            </a:r>
+          </a:p>
+          <a:p>
+            <a:r>
+              <a:rPr lang="da-DK" sz="1400"/>
+              <a:t>Type</a:t>
+            </a:r>
+          </a:p>
+          <a:p>
+            <a:r>
+              <a:rPr lang="da-DK" sz="1400"/>
+              <a:t>Rarity</a:t>
+            </a:r>
+          </a:p>
+          <a:p>
+            <a:r>
+              <a:rPr lang="da-DK" sz="1400"/>
+              <a:t>ItemLevel</a:t>
+            </a:r>
+          </a:p>
+          <a:p>
+            <a:r>
+              <a:rPr lang="da-DK" sz="1400"/>
+              <a:t>JewelSockets</a:t>
+            </a:r>
+          </a:p>
+          <a:p>
+            <a:r>
+              <a:rPr lang="da-DK" sz="1400"/>
+              <a:t>MinDamage</a:t>
+            </a:r>
+          </a:p>
+          <a:p>
+            <a:r>
+              <a:rPr lang="da-DK" sz="1400"/>
+              <a:t>MaxDamage</a:t>
+            </a:r>
+          </a:p>
+          <a:p>
+            <a:r>
+              <a:rPr lang="da-DK" sz="1400"/>
+              <a:t>TwoHanded</a:t>
             </a:r>
             <a:endParaRPr lang="da-DK" sz="1400"/>
           </a:p>
@@ -6405,34 +6434,29 @@
               </a:rPr>
               <a:t>Character</a:t>
             </a:r>
-            <a:endParaRPr lang="da-DK" smtClean="0">
-              <a:solidFill>
-                <a:srgbClr val="FFFF00"/>
-              </a:solidFill>
-            </a:endParaRPr>
-          </a:p>
-          <a:p>
-            <a:r>
-              <a:rPr lang="da-DK" sz="1400" smtClean="0"/>
-              <a:t>name</a:t>
-            </a:r>
-          </a:p>
-          <a:p>
-            <a:r>
-              <a:rPr lang="da-DK" sz="1400" smtClean="0"/>
-              <a:t>race</a:t>
-            </a:r>
-          </a:p>
-          <a:p>
-            <a:r>
-              <a:rPr lang="da-DK" sz="1400" smtClean="0"/>
-              <a:t>class</a:t>
-            </a:r>
-          </a:p>
-          <a:p>
-            <a:r>
-              <a:rPr lang="da-DK" sz="1400" smtClean="0"/>
-              <a:t>health_points</a:t>
+          </a:p>
+          <a:p>
+            <a:r>
+              <a:rPr lang="da-DK" sz="1400"/>
+              <a:t>Name</a:t>
+            </a:r>
+          </a:p>
+          <a:p>
+            <a:r>
+              <a:rPr lang="da-DK" sz="1400"/>
+              <a:t>Race</a:t>
+            </a:r>
+          </a:p>
+          <a:p>
+            <a:r>
+              <a:rPr lang="da-DK" sz="1400"/>
+              <a:t>Class</a:t>
+            </a:r>
+          </a:p>
+          <a:p>
+            <a:r>
+              <a:rPr lang="da-DK" sz="1400"/>
+              <a:t>HealthPoints</a:t>
             </a:r>
             <a:endParaRPr lang="da-DK" sz="1400"/>
           </a:p>
@@ -6487,6 +6511,36 @@
               </a:rPr>
               <a:t>Weapon</a:t>
             </a:r>
+          </a:p>
+        </p:txBody>
+      </p:sp>
+      <p:sp>
+        <p:nvSpPr>
+          <p:cNvPr id="32" name="Tekstfelt 31"/>
+          <p:cNvSpPr txBox="1"/>
+          <p:nvPr/>
+        </p:nvSpPr>
+        <p:spPr>
+          <a:xfrm>
+            <a:off x="10467474" y="5751094"/>
+            <a:ext cx="1491114" cy="369332"/>
+          </a:xfrm>
+          <a:prstGeom prst="rect">
+            <a:avLst/>
+          </a:prstGeom>
+          <a:noFill/>
+        </p:spPr>
+        <p:txBody>
+          <a:bodyPr wrap="none" rtlCol="0">
+            <a:spAutoFit/>
+          </a:bodyPr>
+          <a:lstStyle/>
+          <a:p>
+            <a:r>
+              <a:rPr lang="da-DK" smtClean="0"/>
+              <a:t>DBDesign.4+5</a:t>
+            </a:r>
+            <a:endParaRPr lang="da-DK"/>
           </a:p>
         </p:txBody>
       </p:sp>
@@ -6621,11 +6675,7 @@
           <a:p>
             <a:r>
               <a:rPr lang="da-DK" sz="1400" b="1" smtClean="0"/>
-              <a:t>0</a:t>
-            </a:r>
-            <a:r>
-              <a:rPr lang="da-DK" sz="1400" b="1" smtClean="0"/>
-              <a:t>..1</a:t>
+              <a:t>0..1</a:t>
             </a:r>
             <a:endParaRPr lang="da-DK" sz="1400" b="1"/>
           </a:p>
@@ -6725,11 +6775,7 @@
           <a:p>
             <a:r>
               <a:rPr lang="da-DK" sz="1400" b="1" smtClean="0"/>
-              <a:t>0</a:t>
-            </a:r>
-            <a:r>
-              <a:rPr lang="da-DK" sz="1400" b="1" smtClean="0"/>
-              <a:t>..1</a:t>
+              <a:t>0..1</a:t>
             </a:r>
             <a:endParaRPr lang="da-DK" sz="1400" b="1"/>
           </a:p>
@@ -6889,11 +6935,7 @@
           <a:p>
             <a:r>
               <a:rPr lang="da-DK" sz="1400" b="1" smtClean="0"/>
-              <a:t>0</a:t>
-            </a:r>
-            <a:r>
-              <a:rPr lang="da-DK" sz="1400" b="1" smtClean="0"/>
-              <a:t>..*</a:t>
+              <a:t>0..*</a:t>
             </a:r>
             <a:endParaRPr lang="da-DK" sz="1400" b="1"/>
           </a:p>
@@ -6979,22 +7021,18 @@
           </a:p>
           <a:p>
             <a:r>
-              <a:rPr lang="da-DK" sz="1400" smtClean="0"/>
-              <a:t>name</a:t>
-            </a:r>
-            <a:endParaRPr lang="da-DK" sz="1400" smtClean="0"/>
-          </a:p>
-          <a:p>
-            <a:r>
-              <a:rPr lang="da-DK" sz="1400" smtClean="0"/>
-              <a:t>rarity</a:t>
-            </a:r>
-          </a:p>
-          <a:p>
-            <a:r>
-              <a:rPr lang="da-DK" sz="1400" smtClean="0"/>
-              <a:t>added_damage</a:t>
-            </a:r>
+              <a:rPr lang="da-DK" sz="1400" smtClean="0">
+                <a:solidFill>
+                  <a:schemeClr val="bg1"/>
+                </a:solidFill>
+              </a:rPr>
+              <a:t>CutQuality</a:t>
+            </a:r>
+            <a:endParaRPr lang="da-DK" sz="1400" smtClean="0">
+              <a:solidFill>
+                <a:schemeClr val="bg1"/>
+              </a:solidFill>
+            </a:endParaRPr>
           </a:p>
         </p:txBody>
       </p:sp>
@@ -7122,11 +7160,7 @@
           <a:p>
             <a:r>
               <a:rPr lang="da-DK" sz="1400" b="1" smtClean="0"/>
-              <a:t>0</a:t>
-            </a:r>
-            <a:r>
-              <a:rPr lang="da-DK" sz="1400" b="1" smtClean="0"/>
-              <a:t>..*</a:t>
+              <a:t>0..*</a:t>
             </a:r>
             <a:endParaRPr lang="da-DK" sz="1400" b="1"/>
           </a:p>
@@ -7233,11 +7267,7 @@
           <a:p>
             <a:r>
               <a:rPr lang="da-DK" sz="1400" b="1" smtClean="0"/>
-              <a:t>0</a:t>
-            </a:r>
-            <a:r>
-              <a:rPr lang="da-DK" sz="1400" b="1" smtClean="0"/>
-              <a:t>..1</a:t>
+              <a:t>0..1</a:t>
             </a:r>
             <a:endParaRPr lang="da-DK" sz="1400" b="1"/>
           </a:p>
@@ -7267,11 +7297,7 @@
           <a:p>
             <a:r>
               <a:rPr lang="da-DK" sz="1400" b="1" smtClean="0"/>
-              <a:t>0</a:t>
-            </a:r>
-            <a:r>
-              <a:rPr lang="da-DK" sz="1400" b="1" smtClean="0"/>
-              <a:t>..*</a:t>
+              <a:t>0..*</a:t>
             </a:r>
             <a:endParaRPr lang="da-DK" sz="1400" b="1"/>
           </a:p>
@@ -7362,11 +7388,7 @@
           <a:p>
             <a:r>
               <a:rPr lang="da-DK" sz="1400" b="1" smtClean="0"/>
-              <a:t>0</a:t>
-            </a:r>
-            <a:r>
-              <a:rPr lang="da-DK" sz="1400" b="1" smtClean="0"/>
-              <a:t>..*</a:t>
+              <a:t>0..*</a:t>
             </a:r>
             <a:endParaRPr lang="da-DK" sz="1400" b="1"/>
           </a:p>
@@ -7396,11 +7418,7 @@
           <a:p>
             <a:r>
               <a:rPr lang="da-DK" sz="1400" b="1" smtClean="0"/>
-              <a:t>0</a:t>
-            </a:r>
-            <a:r>
-              <a:rPr lang="da-DK" sz="1400" b="1" smtClean="0"/>
-              <a:t>..*</a:t>
+              <a:t>0..*</a:t>
             </a:r>
             <a:endParaRPr lang="da-DK" sz="1400" b="1"/>
           </a:p>
@@ -7456,21 +7474,20 @@
           </a:p>
           <a:p>
             <a:r>
-              <a:rPr lang="da-DK" sz="1400" smtClean="0"/>
-              <a:t>name</a:t>
-            </a:r>
-            <a:endParaRPr lang="da-DK" sz="1400" smtClean="0"/>
-          </a:p>
-          <a:p>
-            <a:r>
-              <a:rPr lang="da-DK" sz="1400" smtClean="0"/>
-              <a:t>rarity</a:t>
-            </a:r>
-          </a:p>
-          <a:p>
-            <a:r>
-              <a:rPr lang="da-DK" sz="1400" smtClean="0"/>
-              <a:t>added_damage</a:t>
+              <a:rPr lang="da-DK" sz="1400"/>
+              <a:t>Name</a:t>
+            </a:r>
+          </a:p>
+          <a:p>
+            <a:r>
+              <a:rPr lang="da-DK" sz="1400"/>
+              <a:t>Rarity</a:t>
+            </a:r>
+          </a:p>
+          <a:p>
+            <a:r>
+              <a:rPr lang="da-DK" sz="1400"/>
+              <a:t>AddedDamage</a:t>
             </a:r>
           </a:p>
         </p:txBody>
@@ -7525,50 +7542,50 @@
           </a:p>
           <a:p>
             <a:r>
-              <a:rPr lang="da-DK" sz="1400" smtClean="0"/>
-              <a:t>name</a:t>
-            </a:r>
-          </a:p>
-          <a:p>
-            <a:r>
-              <a:rPr lang="da-DK" sz="1400" smtClean="0"/>
-              <a:t>type</a:t>
-            </a:r>
-          </a:p>
-          <a:p>
-            <a:r>
-              <a:rPr lang="da-DK" sz="1400" smtClean="0"/>
-              <a:t>rarity</a:t>
-            </a:r>
-          </a:p>
-          <a:p>
-            <a:r>
-              <a:rPr lang="da-DK" sz="1400" smtClean="0"/>
-              <a:t>item_level</a:t>
-            </a:r>
-          </a:p>
-          <a:p>
-            <a:r>
-              <a:rPr lang="da-DK" sz="1400" smtClean="0"/>
-              <a:t>jewel_sockets</a:t>
-            </a:r>
-          </a:p>
-          <a:p>
-            <a:r>
-              <a:rPr lang="da-DK" sz="1400" smtClean="0"/>
-              <a:t>min_damage</a:t>
-            </a:r>
-          </a:p>
-          <a:p>
-            <a:r>
-              <a:rPr lang="da-DK" sz="1400" smtClean="0"/>
-              <a:t>max_damage</a:t>
-            </a:r>
-          </a:p>
-          <a:p>
-            <a:r>
-              <a:rPr lang="da-DK" sz="1400" smtClean="0"/>
-              <a:t>two_handed</a:t>
+              <a:rPr lang="da-DK" sz="1400"/>
+              <a:t>Name</a:t>
+            </a:r>
+          </a:p>
+          <a:p>
+            <a:r>
+              <a:rPr lang="da-DK" sz="1400"/>
+              <a:t>Type</a:t>
+            </a:r>
+          </a:p>
+          <a:p>
+            <a:r>
+              <a:rPr lang="da-DK" sz="1400"/>
+              <a:t>Rarity</a:t>
+            </a:r>
+          </a:p>
+          <a:p>
+            <a:r>
+              <a:rPr lang="da-DK" sz="1400"/>
+              <a:t>ItemLevel</a:t>
+            </a:r>
+          </a:p>
+          <a:p>
+            <a:r>
+              <a:rPr lang="da-DK" sz="1400"/>
+              <a:t>JewelSockets</a:t>
+            </a:r>
+          </a:p>
+          <a:p>
+            <a:r>
+              <a:rPr lang="da-DK" sz="1400"/>
+              <a:t>MinDamage</a:t>
+            </a:r>
+          </a:p>
+          <a:p>
+            <a:r>
+              <a:rPr lang="da-DK" sz="1400"/>
+              <a:t>MaxDamage</a:t>
+            </a:r>
+          </a:p>
+          <a:p>
+            <a:r>
+              <a:rPr lang="da-DK" sz="1400"/>
+              <a:t>TwoHanded</a:t>
             </a:r>
             <a:endParaRPr lang="da-DK" sz="1400"/>
           </a:p>
@@ -7668,11 +7685,7 @@
           <a:p>
             <a:r>
               <a:rPr lang="da-DK" sz="1400" b="1" smtClean="0"/>
-              <a:t>0</a:t>
-            </a:r>
-            <a:r>
-              <a:rPr lang="da-DK" sz="1400" b="1" smtClean="0"/>
-              <a:t>..*</a:t>
+              <a:t>0..*</a:t>
             </a:r>
             <a:endParaRPr lang="da-DK" sz="1400" b="1"/>
           </a:p>
@@ -7755,34 +7768,29 @@
               </a:rPr>
               <a:t>Character</a:t>
             </a:r>
-            <a:endParaRPr lang="da-DK" smtClean="0">
-              <a:solidFill>
-                <a:srgbClr val="FFFF00"/>
-              </a:solidFill>
-            </a:endParaRPr>
-          </a:p>
-          <a:p>
-            <a:r>
-              <a:rPr lang="da-DK" sz="1400" smtClean="0"/>
-              <a:t>name</a:t>
-            </a:r>
-          </a:p>
-          <a:p>
-            <a:r>
-              <a:rPr lang="da-DK" sz="1400" smtClean="0"/>
-              <a:t>race</a:t>
-            </a:r>
-          </a:p>
-          <a:p>
-            <a:r>
-              <a:rPr lang="da-DK" sz="1400" smtClean="0"/>
-              <a:t>class</a:t>
-            </a:r>
-          </a:p>
-          <a:p>
-            <a:r>
-              <a:rPr lang="da-DK" sz="1400" smtClean="0"/>
-              <a:t>health_points</a:t>
+          </a:p>
+          <a:p>
+            <a:r>
+              <a:rPr lang="da-DK" sz="1400"/>
+              <a:t>Name</a:t>
+            </a:r>
+          </a:p>
+          <a:p>
+            <a:r>
+              <a:rPr lang="da-DK" sz="1400"/>
+              <a:t>Race</a:t>
+            </a:r>
+          </a:p>
+          <a:p>
+            <a:r>
+              <a:rPr lang="da-DK" sz="1400"/>
+              <a:t>Class</a:t>
+            </a:r>
+          </a:p>
+          <a:p>
+            <a:r>
+              <a:rPr lang="da-DK" sz="1400"/>
+              <a:t>HealthPoints</a:t>
             </a:r>
             <a:endParaRPr lang="da-DK" sz="1400"/>
           </a:p>
@@ -7837,6 +7845,36 @@
               </a:rPr>
               <a:t>Weapon</a:t>
             </a:r>
+          </a:p>
+        </p:txBody>
+      </p:sp>
+      <p:sp>
+        <p:nvSpPr>
+          <p:cNvPr id="45" name="Tekstfelt 44"/>
+          <p:cNvSpPr txBox="1"/>
+          <p:nvPr/>
+        </p:nvSpPr>
+        <p:spPr>
+          <a:xfrm>
+            <a:off x="10467474" y="5751094"/>
+            <a:ext cx="1258678" cy="369332"/>
+          </a:xfrm>
+          <a:prstGeom prst="rect">
+            <a:avLst/>
+          </a:prstGeom>
+          <a:noFill/>
+        </p:spPr>
+        <p:txBody>
+          <a:bodyPr wrap="none" rtlCol="0">
+            <a:spAutoFit/>
+          </a:bodyPr>
+          <a:lstStyle/>
+          <a:p>
+            <a:r>
+              <a:rPr lang="da-DK" smtClean="0"/>
+              <a:t>DBDesign.6</a:t>
+            </a:r>
+            <a:endParaRPr lang="da-DK"/>
           </a:p>
         </p:txBody>
       </p:sp>
@@ -7967,11 +8005,7 @@
           <a:p>
             <a:r>
               <a:rPr lang="da-DK" sz="1400" b="1" smtClean="0"/>
-              <a:t>0</a:t>
-            </a:r>
-            <a:r>
-              <a:rPr lang="da-DK" sz="1400" b="1" smtClean="0"/>
-              <a:t>..*</a:t>
+              <a:t>0..*</a:t>
             </a:r>
             <a:endParaRPr lang="da-DK" sz="1400" b="1"/>
           </a:p>
@@ -8101,11 +8135,7 @@
           <a:p>
             <a:r>
               <a:rPr lang="da-DK" sz="1400" b="1" smtClean="0"/>
-              <a:t>0</a:t>
-            </a:r>
-            <a:r>
-              <a:rPr lang="da-DK" sz="1400" b="1" smtClean="0"/>
-              <a:t>..*</a:t>
+              <a:t>0..*</a:t>
             </a:r>
             <a:endParaRPr lang="da-DK" sz="1400" b="1"/>
           </a:p>
@@ -8196,11 +8226,7 @@
           <a:p>
             <a:r>
               <a:rPr lang="da-DK" sz="1400" b="1" smtClean="0"/>
-              <a:t>0</a:t>
-            </a:r>
-            <a:r>
-              <a:rPr lang="da-DK" sz="1400" b="1" smtClean="0"/>
-              <a:t>..*</a:t>
+              <a:t>0..*</a:t>
             </a:r>
             <a:endParaRPr lang="da-DK" sz="1400" b="1"/>
           </a:p>
@@ -8230,11 +8256,7 @@
           <a:p>
             <a:r>
               <a:rPr lang="da-DK" sz="1400" b="1" smtClean="0"/>
-              <a:t>0</a:t>
-            </a:r>
-            <a:r>
-              <a:rPr lang="da-DK" sz="1400" b="1" smtClean="0"/>
-              <a:t>..*</a:t>
+              <a:t>0..*</a:t>
             </a:r>
             <a:endParaRPr lang="da-DK" sz="1400" b="1"/>
           </a:p>
@@ -8290,15 +8312,25 @@
           </a:p>
           <a:p>
             <a:r>
+              <a:rPr lang="da-DK" sz="1600"/>
+              <a:t>N</a:t>
+            </a:r>
+            <a:r>
               <a:rPr lang="da-DK" sz="1600" smtClean="0"/>
-              <a:t>name</a:t>
-            </a:r>
-          </a:p>
-          <a:p>
+              <a:t>ame</a:t>
+            </a:r>
+            <a:endParaRPr lang="da-DK" sz="1600" smtClean="0"/>
+          </a:p>
+          <a:p>
+            <a:r>
+              <a:rPr lang="da-DK" sz="1600"/>
+              <a:t>S</a:t>
+            </a:r>
             <a:r>
               <a:rPr lang="da-DK" sz="1600" smtClean="0"/>
-              <a:t>sector</a:t>
-            </a:r>
+              <a:t>ector</a:t>
+            </a:r>
+            <a:endParaRPr lang="da-DK" sz="1600" smtClean="0"/>
           </a:p>
         </p:txBody>
       </p:sp>
@@ -8349,29 +8381,39 @@
               </a:rPr>
               <a:t>Company</a:t>
             </a:r>
-            <a:endParaRPr lang="da-DK" sz="2000" smtClean="0">
-              <a:solidFill>
-                <a:srgbClr val="FFFF00"/>
-              </a:solidFill>
-            </a:endParaRPr>
-          </a:p>
-          <a:p>
+          </a:p>
+          <a:p>
+            <a:r>
+              <a:rPr lang="da-DK" sz="1600"/>
+              <a:t>N</a:t>
+            </a:r>
             <a:r>
               <a:rPr lang="da-DK" sz="1600" smtClean="0"/>
-              <a:t>name</a:t>
-            </a:r>
-          </a:p>
-          <a:p>
+              <a:t>ame</a:t>
+            </a:r>
+            <a:endParaRPr lang="da-DK" sz="1600" smtClean="0"/>
+          </a:p>
+          <a:p>
+            <a:r>
+              <a:rPr lang="da-DK" sz="1600"/>
+              <a:t>S</a:t>
+            </a:r>
             <a:r>
               <a:rPr lang="da-DK" sz="1600" smtClean="0"/>
-              <a:t>sector</a:t>
-            </a:r>
+              <a:t>ector</a:t>
+            </a:r>
+            <a:endParaRPr lang="da-DK" sz="1600" smtClean="0"/>
           </a:p>
           <a:p>
             <a:r>
               <a:rPr lang="da-DK" sz="1600" smtClean="0"/>
-              <a:t>no_of_employees</a:t>
-            </a:r>
+              <a:t>N</a:t>
+            </a:r>
+            <a:r>
+              <a:rPr lang="da-DK" sz="1600" smtClean="0"/>
+              <a:t>oOfEmployees</a:t>
+            </a:r>
+            <a:endParaRPr lang="da-DK" sz="1600" smtClean="0"/>
           </a:p>
         </p:txBody>
       </p:sp>
@@ -8548,13 +8590,22 @@
           <a:p>
             <a:r>
               <a:rPr lang="da-DK" sz="1600"/>
-              <a:t>name</a:t>
-            </a:r>
-          </a:p>
-          <a:p>
+              <a:t>N</a:t>
+            </a:r>
             <a:r>
               <a:rPr lang="da-DK" sz="1600" smtClean="0"/>
-              <a:t>e-mail</a:t>
+              <a:t>ame</a:t>
+            </a:r>
+            <a:endParaRPr lang="da-DK" sz="1600"/>
+          </a:p>
+          <a:p>
+            <a:r>
+              <a:rPr lang="da-DK" sz="1600"/>
+              <a:t>E</a:t>
+            </a:r>
+            <a:r>
+              <a:rPr lang="da-DK" sz="1600" smtClean="0"/>
+              <a:t>mail</a:t>
             </a:r>
             <a:endParaRPr lang="da-DK" sz="1600"/>
           </a:p>

</xml_diff>

<commit_message>
Adjusted DB domain model slightly
Jewel cut quality now a separate class
</commit_message>
<xml_diff>
--- a/Chap/DB/Presentations/DomainModels.pptx
+++ b/Chap/DB/Presentations/DomainModels.pptx
@@ -249,7 +249,7 @@
           <a:p>
             <a:fld id="{85E35D86-2A90-4BD4-B74B-134833D2E49F}" type="datetimeFigureOut">
               <a:rPr lang="da-DK" smtClean="0"/>
-              <a:t>09-10-2018</a:t>
+              <a:t>11-10-2018</a:t>
             </a:fld>
             <a:endParaRPr lang="da-DK"/>
           </a:p>
@@ -419,7 +419,7 @@
           <a:p>
             <a:fld id="{85E35D86-2A90-4BD4-B74B-134833D2E49F}" type="datetimeFigureOut">
               <a:rPr lang="da-DK" smtClean="0"/>
-              <a:t>09-10-2018</a:t>
+              <a:t>11-10-2018</a:t>
             </a:fld>
             <a:endParaRPr lang="da-DK"/>
           </a:p>
@@ -599,7 +599,7 @@
           <a:p>
             <a:fld id="{85E35D86-2A90-4BD4-B74B-134833D2E49F}" type="datetimeFigureOut">
               <a:rPr lang="da-DK" smtClean="0"/>
-              <a:t>09-10-2018</a:t>
+              <a:t>11-10-2018</a:t>
             </a:fld>
             <a:endParaRPr lang="da-DK"/>
           </a:p>
@@ -769,7 +769,7 @@
           <a:p>
             <a:fld id="{85E35D86-2A90-4BD4-B74B-134833D2E49F}" type="datetimeFigureOut">
               <a:rPr lang="da-DK" smtClean="0"/>
-              <a:t>09-10-2018</a:t>
+              <a:t>11-10-2018</a:t>
             </a:fld>
             <a:endParaRPr lang="da-DK"/>
           </a:p>
@@ -1015,7 +1015,7 @@
           <a:p>
             <a:fld id="{85E35D86-2A90-4BD4-B74B-134833D2E49F}" type="datetimeFigureOut">
               <a:rPr lang="da-DK" smtClean="0"/>
-              <a:t>09-10-2018</a:t>
+              <a:t>11-10-2018</a:t>
             </a:fld>
             <a:endParaRPr lang="da-DK"/>
           </a:p>
@@ -1247,7 +1247,7 @@
           <a:p>
             <a:fld id="{85E35D86-2A90-4BD4-B74B-134833D2E49F}" type="datetimeFigureOut">
               <a:rPr lang="da-DK" smtClean="0"/>
-              <a:t>09-10-2018</a:t>
+              <a:t>11-10-2018</a:t>
             </a:fld>
             <a:endParaRPr lang="da-DK"/>
           </a:p>
@@ -1614,7 +1614,7 @@
           <a:p>
             <a:fld id="{85E35D86-2A90-4BD4-B74B-134833D2E49F}" type="datetimeFigureOut">
               <a:rPr lang="da-DK" smtClean="0"/>
-              <a:t>09-10-2018</a:t>
+              <a:t>11-10-2018</a:t>
             </a:fld>
             <a:endParaRPr lang="da-DK"/>
           </a:p>
@@ -1732,7 +1732,7 @@
           <a:p>
             <a:fld id="{85E35D86-2A90-4BD4-B74B-134833D2E49F}" type="datetimeFigureOut">
               <a:rPr lang="da-DK" smtClean="0"/>
-              <a:t>09-10-2018</a:t>
+              <a:t>11-10-2018</a:t>
             </a:fld>
             <a:endParaRPr lang="da-DK"/>
           </a:p>
@@ -1827,7 +1827,7 @@
           <a:p>
             <a:fld id="{85E35D86-2A90-4BD4-B74B-134833D2E49F}" type="datetimeFigureOut">
               <a:rPr lang="da-DK" smtClean="0"/>
-              <a:t>09-10-2018</a:t>
+              <a:t>11-10-2018</a:t>
             </a:fld>
             <a:endParaRPr lang="da-DK"/>
           </a:p>
@@ -2104,7 +2104,7 @@
           <a:p>
             <a:fld id="{85E35D86-2A90-4BD4-B74B-134833D2E49F}" type="datetimeFigureOut">
               <a:rPr lang="da-DK" smtClean="0"/>
-              <a:t>09-10-2018</a:t>
+              <a:t>11-10-2018</a:t>
             </a:fld>
             <a:endParaRPr lang="da-DK"/>
           </a:p>
@@ -2357,7 +2357,7 @@
           <a:p>
             <a:fld id="{85E35D86-2A90-4BD4-B74B-134833D2E49F}" type="datetimeFigureOut">
               <a:rPr lang="da-DK" smtClean="0"/>
-              <a:t>09-10-2018</a:t>
+              <a:t>11-10-2018</a:t>
             </a:fld>
             <a:endParaRPr lang="da-DK"/>
           </a:p>
@@ -2570,7 +2570,7 @@
           <a:p>
             <a:fld id="{85E35D86-2A90-4BD4-B74B-134833D2E49F}" type="datetimeFigureOut">
               <a:rPr lang="da-DK" smtClean="0"/>
-              <a:t>09-10-2018</a:t>
+              <a:t>11-10-2018</a:t>
             </a:fld>
             <a:endParaRPr lang="da-DK"/>
           </a:p>
@@ -3324,7 +3324,6 @@
               <a:rPr lang="da-DK" sz="1400" smtClean="0"/>
               <a:t>ame</a:t>
             </a:r>
-            <a:endParaRPr lang="da-DK" sz="1400" smtClean="0"/>
           </a:p>
           <a:p>
             <a:r>
@@ -3335,7 +3334,6 @@
               <a:rPr lang="da-DK" sz="1400" smtClean="0"/>
               <a:t>ype</a:t>
             </a:r>
-            <a:endParaRPr lang="da-DK" sz="1400" smtClean="0"/>
           </a:p>
           <a:p>
             <a:r>
@@ -3346,51 +3344,30 @@
               <a:rPr lang="da-DK" sz="1400" smtClean="0"/>
               <a:t>arity</a:t>
             </a:r>
-            <a:endParaRPr lang="da-DK" sz="1400" smtClean="0"/>
           </a:p>
           <a:p>
             <a:r>
               <a:rPr lang="da-DK" sz="1400" smtClean="0"/>
-              <a:t>I</a:t>
-            </a:r>
+              <a:t>ItemLevel</a:t>
+            </a:r>
+          </a:p>
+          <a:p>
             <a:r>
               <a:rPr lang="da-DK" sz="1400" smtClean="0"/>
-              <a:t>temLevel</a:t>
-            </a:r>
-            <a:endParaRPr lang="da-DK" sz="1400" smtClean="0"/>
+              <a:t>JewelSockets</a:t>
+            </a:r>
           </a:p>
           <a:p>
             <a:r>
               <a:rPr lang="da-DK" sz="1400" smtClean="0"/>
-              <a:t>J</a:t>
-            </a:r>
+              <a:t>MinDamage</a:t>
+            </a:r>
+          </a:p>
+          <a:p>
             <a:r>
               <a:rPr lang="da-DK" sz="1400" smtClean="0"/>
-              <a:t>ewelSockets</a:t>
-            </a:r>
-            <a:endParaRPr lang="da-DK" sz="1400" smtClean="0"/>
-          </a:p>
-          <a:p>
-            <a:r>
-              <a:rPr lang="da-DK" sz="1400" smtClean="0"/>
-              <a:t>M</a:t>
-            </a:r>
-            <a:r>
-              <a:rPr lang="da-DK" sz="1400" smtClean="0"/>
-              <a:t>inDamage</a:t>
-            </a:r>
-            <a:endParaRPr lang="da-DK" sz="1400" smtClean="0"/>
-          </a:p>
-          <a:p>
-            <a:r>
-              <a:rPr lang="da-DK" sz="1400" smtClean="0"/>
-              <a:t>M</a:t>
-            </a:r>
-            <a:r>
-              <a:rPr lang="da-DK" sz="1400" smtClean="0"/>
-              <a:t>axDamage</a:t>
-            </a:r>
-            <a:endParaRPr lang="da-DK" sz="1400" smtClean="0"/>
+              <a:t>MaxDamage</a:t>
+            </a:r>
           </a:p>
           <a:p>
             <a:r>
@@ -3462,7 +3439,6 @@
               <a:rPr lang="da-DK" sz="1400" smtClean="0"/>
               <a:t>ame</a:t>
             </a:r>
-            <a:endParaRPr lang="da-DK" sz="1400" smtClean="0"/>
           </a:p>
           <a:p>
             <a:r>
@@ -3473,7 +3449,6 @@
               <a:rPr lang="da-DK" sz="1400" smtClean="0"/>
               <a:t>ace</a:t>
             </a:r>
-            <a:endParaRPr lang="da-DK" sz="1400" smtClean="0"/>
           </a:p>
           <a:p>
             <a:r>
@@ -3484,16 +3459,11 @@
               <a:rPr lang="da-DK" sz="1400" smtClean="0"/>
               <a:t>lass</a:t>
             </a:r>
-            <a:endParaRPr lang="da-DK" sz="1400" smtClean="0"/>
           </a:p>
           <a:p>
             <a:r>
               <a:rPr lang="da-DK" sz="1400" smtClean="0"/>
-              <a:t>H</a:t>
-            </a:r>
-            <a:r>
-              <a:rPr lang="da-DK" sz="1400" smtClean="0"/>
-              <a:t>ealthPoints</a:t>
+              <a:t>HealthPoints</a:t>
             </a:r>
             <a:endParaRPr lang="da-DK" sz="1400"/>
           </a:p>
@@ -3897,7 +3867,6 @@
               <a:rPr lang="da-DK" sz="1400"/>
               <a:t>HealthPoints</a:t>
             </a:r>
-            <a:endParaRPr lang="da-DK" sz="1400"/>
           </a:p>
         </p:txBody>
       </p:sp>
@@ -4156,7 +4125,6 @@
               <a:rPr lang="da-DK" sz="1400"/>
               <a:t>TwoHanded</a:t>
             </a:r>
-            <a:endParaRPr lang="da-DK" sz="1400"/>
           </a:p>
         </p:txBody>
       </p:sp>
@@ -5073,7 +5041,6 @@
               <a:rPr lang="da-DK" sz="1400" smtClean="0"/>
               <a:t>ame</a:t>
             </a:r>
-            <a:endParaRPr lang="da-DK" sz="1400" smtClean="0"/>
           </a:p>
           <a:p>
             <a:r>
@@ -5084,18 +5051,12 @@
               <a:rPr lang="da-DK" sz="1400" smtClean="0"/>
               <a:t>arity</a:t>
             </a:r>
-            <a:endParaRPr lang="da-DK" sz="1400" smtClean="0"/>
           </a:p>
           <a:p>
             <a:r>
               <a:rPr lang="da-DK" sz="1400" smtClean="0"/>
-              <a:t>A</a:t>
-            </a:r>
-            <a:r>
-              <a:rPr lang="da-DK" sz="1400" smtClean="0"/>
-              <a:t>ddedDamage</a:t>
-            </a:r>
-            <a:endParaRPr lang="da-DK" sz="1400" smtClean="0"/>
+              <a:t>AddedDamage</a:t>
+            </a:r>
           </a:p>
         </p:txBody>
       </p:sp>
@@ -5194,7 +5155,6 @@
               <a:rPr lang="da-DK" sz="1400"/>
               <a:t>TwoHanded</a:t>
             </a:r>
-            <a:endParaRPr lang="da-DK" sz="1400"/>
           </a:p>
         </p:txBody>
       </p:sp>
@@ -5269,7 +5229,6 @@
               <a:rPr lang="da-DK" sz="1400"/>
               <a:t>HealthPoints</a:t>
             </a:r>
-            <a:endParaRPr lang="da-DK" sz="1400"/>
           </a:p>
         </p:txBody>
       </p:sp>
@@ -6383,7 +6342,6 @@
               <a:rPr lang="da-DK" sz="1400"/>
               <a:t>TwoHanded</a:t>
             </a:r>
-            <a:endParaRPr lang="da-DK" sz="1400"/>
           </a:p>
         </p:txBody>
       </p:sp>
@@ -6458,7 +6416,6 @@
               <a:rPr lang="da-DK" sz="1400"/>
               <a:t>HealthPoints</a:t>
             </a:r>
-            <a:endParaRPr lang="da-DK" sz="1400"/>
           </a:p>
         </p:txBody>
       </p:sp>
@@ -6971,22 +6928,410 @@
           </a:p>
         </p:txBody>
       </p:sp>
-      <p:sp>
-        <p:nvSpPr>
-          <p:cNvPr id="20" name="Afrundet rektangel 19"/>
+      <p:cxnSp>
+        <p:nvCxnSpPr>
+          <p:cNvPr id="22" name="Lige forbindelse 21"/>
+          <p:cNvCxnSpPr/>
+          <p:nvPr/>
+        </p:nvCxnSpPr>
+        <p:spPr>
+          <a:xfrm>
+            <a:off x="1996888" y="5171177"/>
+            <a:ext cx="1718135" cy="0"/>
+          </a:xfrm>
+          <a:prstGeom prst="line">
+            <a:avLst/>
+          </a:prstGeom>
+        </p:spPr>
+        <p:style>
+          <a:lnRef idx="3">
+            <a:schemeClr val="dk1"/>
+          </a:lnRef>
+          <a:fillRef idx="0">
+            <a:schemeClr val="dk1"/>
+          </a:fillRef>
+          <a:effectRef idx="2">
+            <a:schemeClr val="dk1"/>
+          </a:effectRef>
+          <a:fontRef idx="minor">
+            <a:schemeClr val="tx1"/>
+          </a:fontRef>
+        </p:style>
+      </p:cxnSp>
+      <p:sp>
+        <p:nvSpPr>
+          <p:cNvPr id="23" name="Tekstfelt 22"/>
+          <p:cNvSpPr txBox="1"/>
+          <p:nvPr/>
+        </p:nvSpPr>
+        <p:spPr>
+          <a:xfrm>
+            <a:off x="1933060" y="4821142"/>
+            <a:ext cx="1718740" cy="369332"/>
+          </a:xfrm>
+          <a:prstGeom prst="rect">
+            <a:avLst/>
+          </a:prstGeom>
+          <a:noFill/>
+        </p:spPr>
+        <p:txBody>
+          <a:bodyPr wrap="none" rtlCol="0">
+            <a:spAutoFit/>
+          </a:bodyPr>
+          <a:lstStyle/>
+          <a:p>
+            <a:r>
+              <a:rPr lang="da-DK" b="1" smtClean="0"/>
+              <a:t> </a:t>
+            </a:r>
+            <a:r>
+              <a:rPr lang="da-DK" b="1" smtClean="0">
+                <a:sym typeface="Wingdings" panose="05000000000000000000" pitchFamily="2" charset="2"/>
+              </a:rPr>
+              <a:t> </a:t>
+            </a:r>
+            <a:r>
+              <a:rPr lang="da-DK" b="1" smtClean="0"/>
+              <a:t>is instance of</a:t>
+            </a:r>
+            <a:endParaRPr lang="da-DK" b="1"/>
+          </a:p>
+        </p:txBody>
+      </p:sp>
+      <p:sp>
+        <p:nvSpPr>
+          <p:cNvPr id="27" name="Tekstfelt 26"/>
+          <p:cNvSpPr txBox="1"/>
+          <p:nvPr/>
+        </p:nvSpPr>
+        <p:spPr>
+          <a:xfrm>
+            <a:off x="1983609" y="5149084"/>
+            <a:ext cx="276038" cy="307777"/>
+          </a:xfrm>
+          <a:prstGeom prst="rect">
+            <a:avLst/>
+          </a:prstGeom>
+          <a:noFill/>
+        </p:spPr>
+        <p:txBody>
+          <a:bodyPr wrap="none" rtlCol="0">
+            <a:spAutoFit/>
+          </a:bodyPr>
+          <a:lstStyle/>
+          <a:p>
+            <a:r>
+              <a:rPr lang="da-DK" sz="1400" b="1" smtClean="0"/>
+              <a:t>1</a:t>
+            </a:r>
+            <a:endParaRPr lang="da-DK" sz="1400" b="1"/>
+          </a:p>
+        </p:txBody>
+      </p:sp>
+      <p:sp>
+        <p:nvSpPr>
+          <p:cNvPr id="29" name="Tekstfelt 28"/>
+          <p:cNvSpPr txBox="1"/>
+          <p:nvPr/>
+        </p:nvSpPr>
+        <p:spPr>
+          <a:xfrm>
+            <a:off x="3288841" y="5143010"/>
+            <a:ext cx="461986" cy="307777"/>
+          </a:xfrm>
+          <a:prstGeom prst="rect">
+            <a:avLst/>
+          </a:prstGeom>
+          <a:noFill/>
+        </p:spPr>
+        <p:txBody>
+          <a:bodyPr wrap="none" rtlCol="0">
+            <a:spAutoFit/>
+          </a:bodyPr>
+          <a:lstStyle/>
+          <a:p>
+            <a:r>
+              <a:rPr lang="da-DK" sz="1400" b="1" smtClean="0"/>
+              <a:t>0..*</a:t>
+            </a:r>
+            <a:endParaRPr lang="da-DK" sz="1400" b="1"/>
+          </a:p>
+        </p:txBody>
+      </p:sp>
+      <p:cxnSp>
+        <p:nvCxnSpPr>
+          <p:cNvPr id="30" name="Lige forbindelse 29"/>
+          <p:cNvCxnSpPr>
+            <a:stCxn id="9" idx="2"/>
+            <a:endCxn id="20" idx="0"/>
+          </p:cNvCxnSpPr>
+          <p:nvPr/>
+        </p:nvCxnSpPr>
+        <p:spPr>
+          <a:xfrm>
+            <a:off x="4586571" y="2687594"/>
+            <a:ext cx="7878" cy="1360629"/>
+          </a:xfrm>
+          <a:prstGeom prst="line">
+            <a:avLst/>
+          </a:prstGeom>
+        </p:spPr>
+        <p:style>
+          <a:lnRef idx="3">
+            <a:schemeClr val="dk1"/>
+          </a:lnRef>
+          <a:fillRef idx="0">
+            <a:schemeClr val="dk1"/>
+          </a:fillRef>
+          <a:effectRef idx="2">
+            <a:schemeClr val="dk1"/>
+          </a:effectRef>
+          <a:fontRef idx="minor">
+            <a:schemeClr val="tx1"/>
+          </a:fontRef>
+        </p:style>
+      </p:cxnSp>
+      <p:sp>
+        <p:nvSpPr>
+          <p:cNvPr id="31" name="Tekstfelt 30"/>
+          <p:cNvSpPr txBox="1"/>
+          <p:nvPr/>
+        </p:nvSpPr>
+        <p:spPr>
+          <a:xfrm>
+            <a:off x="4527206" y="3062147"/>
+            <a:ext cx="1530099" cy="646331"/>
+          </a:xfrm>
+          <a:prstGeom prst="rect">
+            <a:avLst/>
+          </a:prstGeom>
+          <a:noFill/>
+        </p:spPr>
+        <p:txBody>
+          <a:bodyPr wrap="none" rtlCol="0">
+            <a:spAutoFit/>
+          </a:bodyPr>
+          <a:lstStyle/>
+          <a:p>
+            <a:pPr algn="ctr"/>
+            <a:r>
+              <a:rPr lang="da-DK" b="1" smtClean="0"/>
+              <a:t> </a:t>
+            </a:r>
+            <a:r>
+              <a:rPr lang="da-DK" b="1" smtClean="0">
+                <a:sym typeface="Wingdings" panose="05000000000000000000" pitchFamily="2" charset="2"/>
+              </a:rPr>
+              <a:t></a:t>
+            </a:r>
+          </a:p>
+          <a:p>
+            <a:pPr algn="ctr"/>
+            <a:r>
+              <a:rPr lang="da-DK" b="1" smtClean="0"/>
+              <a:t>is socketed on</a:t>
+            </a:r>
+            <a:endParaRPr lang="da-DK" b="1"/>
+          </a:p>
+        </p:txBody>
+      </p:sp>
+      <p:sp>
+        <p:nvSpPr>
+          <p:cNvPr id="35" name="Tekstfelt 34"/>
+          <p:cNvSpPr txBox="1"/>
+          <p:nvPr/>
+        </p:nvSpPr>
+        <p:spPr>
+          <a:xfrm>
+            <a:off x="4586571" y="2641022"/>
+            <a:ext cx="463588" cy="307777"/>
+          </a:xfrm>
+          <a:prstGeom prst="rect">
+            <a:avLst/>
+          </a:prstGeom>
+          <a:noFill/>
+        </p:spPr>
+        <p:txBody>
+          <a:bodyPr wrap="none" rtlCol="0">
+            <a:spAutoFit/>
+          </a:bodyPr>
+          <a:lstStyle/>
+          <a:p>
+            <a:r>
+              <a:rPr lang="da-DK" sz="1400" b="1" smtClean="0"/>
+              <a:t>0..1</a:t>
+            </a:r>
+            <a:endParaRPr lang="da-DK" sz="1400" b="1"/>
+          </a:p>
+        </p:txBody>
+      </p:sp>
+      <p:sp>
+        <p:nvSpPr>
+          <p:cNvPr id="36" name="Tekstfelt 35"/>
+          <p:cNvSpPr txBox="1"/>
+          <p:nvPr/>
+        </p:nvSpPr>
+        <p:spPr>
+          <a:xfrm>
+            <a:off x="4597254" y="3761413"/>
+            <a:ext cx="461986" cy="307777"/>
+          </a:xfrm>
+          <a:prstGeom prst="rect">
+            <a:avLst/>
+          </a:prstGeom>
+          <a:noFill/>
+        </p:spPr>
+        <p:txBody>
+          <a:bodyPr wrap="none" rtlCol="0">
+            <a:spAutoFit/>
+          </a:bodyPr>
+          <a:lstStyle/>
+          <a:p>
+            <a:r>
+              <a:rPr lang="da-DK" sz="1400" b="1" smtClean="0"/>
+              <a:t>0..*</a:t>
+            </a:r>
+            <a:endParaRPr lang="da-DK" sz="1400" b="1"/>
+          </a:p>
+        </p:txBody>
+      </p:sp>
+      <p:cxnSp>
+        <p:nvCxnSpPr>
+          <p:cNvPr id="37" name="Lige forbindelse 36"/>
+          <p:cNvCxnSpPr/>
+          <p:nvPr/>
+        </p:nvCxnSpPr>
+        <p:spPr>
+          <a:xfrm>
+            <a:off x="1055178" y="2699715"/>
+            <a:ext cx="7878" cy="1360629"/>
+          </a:xfrm>
+          <a:prstGeom prst="line">
+            <a:avLst/>
+          </a:prstGeom>
+        </p:spPr>
+        <p:style>
+          <a:lnRef idx="3">
+            <a:schemeClr val="dk1"/>
+          </a:lnRef>
+          <a:fillRef idx="0">
+            <a:schemeClr val="dk1"/>
+          </a:fillRef>
+          <a:effectRef idx="2">
+            <a:schemeClr val="dk1"/>
+          </a:effectRef>
+          <a:fontRef idx="minor">
+            <a:schemeClr val="tx1"/>
+          </a:fontRef>
+        </p:style>
+      </p:cxnSp>
+      <p:sp>
+        <p:nvSpPr>
+          <p:cNvPr id="38" name="Tekstfelt 37"/>
+          <p:cNvSpPr txBox="1"/>
+          <p:nvPr/>
+        </p:nvSpPr>
+        <p:spPr>
+          <a:xfrm>
+            <a:off x="1065861" y="3183242"/>
+            <a:ext cx="987450" cy="369332"/>
+          </a:xfrm>
+          <a:prstGeom prst="rect">
+            <a:avLst/>
+          </a:prstGeom>
+          <a:noFill/>
+        </p:spPr>
+        <p:txBody>
+          <a:bodyPr wrap="none" rtlCol="0">
+            <a:spAutoFit/>
+          </a:bodyPr>
+          <a:lstStyle/>
+          <a:p>
+            <a:pPr algn="ctr"/>
+            <a:r>
+              <a:rPr lang="da-DK" b="1" smtClean="0"/>
+              <a:t>matches</a:t>
+            </a:r>
+            <a:endParaRPr lang="da-DK" b="1"/>
+          </a:p>
+        </p:txBody>
+      </p:sp>
+      <p:sp>
+        <p:nvSpPr>
+          <p:cNvPr id="39" name="Tekstfelt 38"/>
+          <p:cNvSpPr txBox="1"/>
+          <p:nvPr/>
+        </p:nvSpPr>
+        <p:spPr>
+          <a:xfrm>
+            <a:off x="1055178" y="2653143"/>
+            <a:ext cx="461986" cy="307777"/>
+          </a:xfrm>
+          <a:prstGeom prst="rect">
+            <a:avLst/>
+          </a:prstGeom>
+          <a:noFill/>
+        </p:spPr>
+        <p:txBody>
+          <a:bodyPr wrap="none" rtlCol="0">
+            <a:spAutoFit/>
+          </a:bodyPr>
+          <a:lstStyle/>
+          <a:p>
+            <a:r>
+              <a:rPr lang="da-DK" sz="1400" b="1" smtClean="0"/>
+              <a:t>0..*</a:t>
+            </a:r>
+            <a:endParaRPr lang="da-DK" sz="1400" b="1"/>
+          </a:p>
+        </p:txBody>
+      </p:sp>
+      <p:sp>
+        <p:nvSpPr>
+          <p:cNvPr id="40" name="Tekstfelt 39"/>
+          <p:cNvSpPr txBox="1"/>
+          <p:nvPr/>
+        </p:nvSpPr>
+        <p:spPr>
+          <a:xfrm>
+            <a:off x="1065861" y="3773534"/>
+            <a:ext cx="461986" cy="307777"/>
+          </a:xfrm>
+          <a:prstGeom prst="rect">
+            <a:avLst/>
+          </a:prstGeom>
+          <a:noFill/>
+        </p:spPr>
+        <p:txBody>
+          <a:bodyPr wrap="none" rtlCol="0">
+            <a:spAutoFit/>
+          </a:bodyPr>
+          <a:lstStyle/>
+          <a:p>
+            <a:r>
+              <a:rPr lang="da-DK" sz="1400" b="1" smtClean="0"/>
+              <a:t>0..*</a:t>
+            </a:r>
+            <a:endParaRPr lang="da-DK" sz="1400" b="1"/>
+          </a:p>
+        </p:txBody>
+      </p:sp>
+      <p:sp>
+        <p:nvSpPr>
+          <p:cNvPr id="19" name="Afrundet rektangel 18"/>
           <p:cNvSpPr/>
           <p:nvPr/>
         </p:nvSpPr>
         <p:spPr>
           <a:xfrm>
-            <a:off x="3721366" y="4048223"/>
+            <a:off x="251664" y="4048224"/>
             <a:ext cx="1746166" cy="2330033"/>
           </a:xfrm>
           <a:prstGeom prst="roundRect">
             <a:avLst/>
           </a:prstGeom>
           <a:solidFill>
-            <a:srgbClr val="002060"/>
+            <a:srgbClr val="7030A0"/>
           </a:solidFill>
         </p:spPr>
         <p:style>
@@ -7016,430 +7361,45 @@
                   <a:srgbClr val="FFFF00"/>
                 </a:solidFill>
               </a:rPr>
-              <a:t>Jewel</a:t>
-            </a:r>
-          </a:p>
-          <a:p>
-            <a:r>
-              <a:rPr lang="da-DK" sz="1400" smtClean="0">
-                <a:solidFill>
-                  <a:schemeClr val="bg1"/>
-                </a:solidFill>
-              </a:rPr>
-              <a:t>CutQuality</a:t>
-            </a:r>
-            <a:endParaRPr lang="da-DK" sz="1400" smtClean="0">
-              <a:solidFill>
-                <a:schemeClr val="bg1"/>
-              </a:solidFill>
-            </a:endParaRPr>
-          </a:p>
-        </p:txBody>
-      </p:sp>
-      <p:cxnSp>
-        <p:nvCxnSpPr>
-          <p:cNvPr id="22" name="Lige forbindelse 21"/>
-          <p:cNvCxnSpPr/>
-          <p:nvPr/>
-        </p:nvCxnSpPr>
-        <p:spPr>
-          <a:xfrm>
-            <a:off x="1996888" y="5171177"/>
-            <a:ext cx="1718135" cy="0"/>
-          </a:xfrm>
-          <a:prstGeom prst="line">
-            <a:avLst/>
-          </a:prstGeom>
-        </p:spPr>
-        <p:style>
-          <a:lnRef idx="3">
-            <a:schemeClr val="dk1"/>
-          </a:lnRef>
-          <a:fillRef idx="0">
-            <a:schemeClr val="dk1"/>
-          </a:fillRef>
-          <a:effectRef idx="2">
-            <a:schemeClr val="dk1"/>
-          </a:effectRef>
-          <a:fontRef idx="minor">
-            <a:schemeClr val="tx1"/>
-          </a:fontRef>
-        </p:style>
-      </p:cxnSp>
-      <p:sp>
-        <p:nvSpPr>
-          <p:cNvPr id="23" name="Tekstfelt 22"/>
-          <p:cNvSpPr txBox="1"/>
-          <p:nvPr/>
-        </p:nvSpPr>
-        <p:spPr>
-          <a:xfrm>
-            <a:off x="1933060" y="4821142"/>
-            <a:ext cx="1718740" cy="369332"/>
-          </a:xfrm>
-          <a:prstGeom prst="rect">
-            <a:avLst/>
-          </a:prstGeom>
-          <a:noFill/>
-        </p:spPr>
-        <p:txBody>
-          <a:bodyPr wrap="none" rtlCol="0">
-            <a:spAutoFit/>
-          </a:bodyPr>
-          <a:lstStyle/>
-          <a:p>
-            <a:r>
-              <a:rPr lang="da-DK" b="1" smtClean="0"/>
-              <a:t> </a:t>
-            </a:r>
-            <a:r>
-              <a:rPr lang="da-DK" b="1" smtClean="0">
-                <a:sym typeface="Wingdings" panose="05000000000000000000" pitchFamily="2" charset="2"/>
-              </a:rPr>
-              <a:t> </a:t>
-            </a:r>
-            <a:r>
-              <a:rPr lang="da-DK" b="1" smtClean="0"/>
-              <a:t>is instance of</a:t>
-            </a:r>
-            <a:endParaRPr lang="da-DK" b="1"/>
-          </a:p>
-        </p:txBody>
-      </p:sp>
-      <p:sp>
-        <p:nvSpPr>
-          <p:cNvPr id="27" name="Tekstfelt 26"/>
-          <p:cNvSpPr txBox="1"/>
-          <p:nvPr/>
-        </p:nvSpPr>
-        <p:spPr>
-          <a:xfrm>
-            <a:off x="1983609" y="5149084"/>
-            <a:ext cx="276038" cy="307777"/>
-          </a:xfrm>
-          <a:prstGeom prst="rect">
-            <a:avLst/>
-          </a:prstGeom>
-          <a:noFill/>
-        </p:spPr>
-        <p:txBody>
-          <a:bodyPr wrap="none" rtlCol="0">
-            <a:spAutoFit/>
-          </a:bodyPr>
-          <a:lstStyle/>
-          <a:p>
-            <a:r>
-              <a:rPr lang="da-DK" sz="1400" b="1" smtClean="0"/>
-              <a:t>1</a:t>
-            </a:r>
-            <a:endParaRPr lang="da-DK" sz="1400" b="1"/>
-          </a:p>
-        </p:txBody>
-      </p:sp>
-      <p:sp>
-        <p:nvSpPr>
-          <p:cNvPr id="29" name="Tekstfelt 28"/>
-          <p:cNvSpPr txBox="1"/>
-          <p:nvPr/>
-        </p:nvSpPr>
-        <p:spPr>
-          <a:xfrm>
-            <a:off x="3288841" y="5143010"/>
-            <a:ext cx="461986" cy="307777"/>
-          </a:xfrm>
-          <a:prstGeom prst="rect">
-            <a:avLst/>
-          </a:prstGeom>
-          <a:noFill/>
-        </p:spPr>
-        <p:txBody>
-          <a:bodyPr wrap="none" rtlCol="0">
-            <a:spAutoFit/>
-          </a:bodyPr>
-          <a:lstStyle/>
-          <a:p>
-            <a:r>
-              <a:rPr lang="da-DK" sz="1400" b="1" smtClean="0"/>
-              <a:t>0..*</a:t>
-            </a:r>
-            <a:endParaRPr lang="da-DK" sz="1400" b="1"/>
-          </a:p>
-        </p:txBody>
-      </p:sp>
-      <p:cxnSp>
-        <p:nvCxnSpPr>
-          <p:cNvPr id="30" name="Lige forbindelse 29"/>
-          <p:cNvCxnSpPr>
-            <a:stCxn id="9" idx="2"/>
-            <a:endCxn id="20" idx="0"/>
-          </p:cNvCxnSpPr>
-          <p:nvPr/>
-        </p:nvCxnSpPr>
-        <p:spPr>
-          <a:xfrm>
-            <a:off x="4586571" y="2687594"/>
-            <a:ext cx="7878" cy="1360629"/>
-          </a:xfrm>
-          <a:prstGeom prst="line">
-            <a:avLst/>
-          </a:prstGeom>
-        </p:spPr>
-        <p:style>
-          <a:lnRef idx="3">
-            <a:schemeClr val="dk1"/>
-          </a:lnRef>
-          <a:fillRef idx="0">
-            <a:schemeClr val="dk1"/>
-          </a:fillRef>
-          <a:effectRef idx="2">
-            <a:schemeClr val="dk1"/>
-          </a:effectRef>
-          <a:fontRef idx="minor">
-            <a:schemeClr val="tx1"/>
-          </a:fontRef>
-        </p:style>
-      </p:cxnSp>
-      <p:sp>
-        <p:nvSpPr>
-          <p:cNvPr id="31" name="Tekstfelt 30"/>
-          <p:cNvSpPr txBox="1"/>
-          <p:nvPr/>
-        </p:nvSpPr>
-        <p:spPr>
-          <a:xfrm>
-            <a:off x="4527206" y="3062147"/>
-            <a:ext cx="1530099" cy="646331"/>
-          </a:xfrm>
-          <a:prstGeom prst="rect">
-            <a:avLst/>
-          </a:prstGeom>
-          <a:noFill/>
-        </p:spPr>
-        <p:txBody>
-          <a:bodyPr wrap="none" rtlCol="0">
-            <a:spAutoFit/>
-          </a:bodyPr>
-          <a:lstStyle/>
-          <a:p>
-            <a:pPr algn="ctr"/>
-            <a:r>
-              <a:rPr lang="da-DK" b="1" smtClean="0"/>
-              <a:t> </a:t>
-            </a:r>
-            <a:r>
-              <a:rPr lang="da-DK" b="1" smtClean="0">
-                <a:sym typeface="Wingdings" panose="05000000000000000000" pitchFamily="2" charset="2"/>
-              </a:rPr>
-              <a:t></a:t>
-            </a:r>
-          </a:p>
-          <a:p>
-            <a:pPr algn="ctr"/>
-            <a:r>
-              <a:rPr lang="da-DK" b="1" smtClean="0"/>
-              <a:t>is socketed on</a:t>
-            </a:r>
-            <a:endParaRPr lang="da-DK" b="1"/>
-          </a:p>
-        </p:txBody>
-      </p:sp>
-      <p:sp>
-        <p:nvSpPr>
-          <p:cNvPr id="35" name="Tekstfelt 34"/>
-          <p:cNvSpPr txBox="1"/>
-          <p:nvPr/>
-        </p:nvSpPr>
-        <p:spPr>
-          <a:xfrm>
-            <a:off x="4586571" y="2641022"/>
-            <a:ext cx="463588" cy="307777"/>
-          </a:xfrm>
-          <a:prstGeom prst="rect">
-            <a:avLst/>
-          </a:prstGeom>
-          <a:noFill/>
-        </p:spPr>
-        <p:txBody>
-          <a:bodyPr wrap="none" rtlCol="0">
-            <a:spAutoFit/>
-          </a:bodyPr>
-          <a:lstStyle/>
-          <a:p>
-            <a:r>
-              <a:rPr lang="da-DK" sz="1400" b="1" smtClean="0"/>
-              <a:t>0..1</a:t>
-            </a:r>
-            <a:endParaRPr lang="da-DK" sz="1400" b="1"/>
-          </a:p>
-        </p:txBody>
-      </p:sp>
-      <p:sp>
-        <p:nvSpPr>
-          <p:cNvPr id="36" name="Tekstfelt 35"/>
-          <p:cNvSpPr txBox="1"/>
-          <p:nvPr/>
-        </p:nvSpPr>
-        <p:spPr>
-          <a:xfrm>
-            <a:off x="4597254" y="3761413"/>
-            <a:ext cx="461986" cy="307777"/>
-          </a:xfrm>
-          <a:prstGeom prst="rect">
-            <a:avLst/>
-          </a:prstGeom>
-          <a:noFill/>
-        </p:spPr>
-        <p:txBody>
-          <a:bodyPr wrap="none" rtlCol="0">
-            <a:spAutoFit/>
-          </a:bodyPr>
-          <a:lstStyle/>
-          <a:p>
-            <a:r>
-              <a:rPr lang="da-DK" sz="1400" b="1" smtClean="0"/>
-              <a:t>0..*</a:t>
-            </a:r>
-            <a:endParaRPr lang="da-DK" sz="1400" b="1"/>
-          </a:p>
-        </p:txBody>
-      </p:sp>
-      <p:cxnSp>
-        <p:nvCxnSpPr>
-          <p:cNvPr id="37" name="Lige forbindelse 36"/>
-          <p:cNvCxnSpPr/>
-          <p:nvPr/>
-        </p:nvCxnSpPr>
-        <p:spPr>
-          <a:xfrm>
-            <a:off x="1055178" y="2699715"/>
-            <a:ext cx="7878" cy="1360629"/>
-          </a:xfrm>
-          <a:prstGeom prst="line">
-            <a:avLst/>
-          </a:prstGeom>
-        </p:spPr>
-        <p:style>
-          <a:lnRef idx="3">
-            <a:schemeClr val="dk1"/>
-          </a:lnRef>
-          <a:fillRef idx="0">
-            <a:schemeClr val="dk1"/>
-          </a:fillRef>
-          <a:effectRef idx="2">
-            <a:schemeClr val="dk1"/>
-          </a:effectRef>
-          <a:fontRef idx="minor">
-            <a:schemeClr val="tx1"/>
-          </a:fontRef>
-        </p:style>
-      </p:cxnSp>
-      <p:sp>
-        <p:nvSpPr>
-          <p:cNvPr id="38" name="Tekstfelt 37"/>
-          <p:cNvSpPr txBox="1"/>
-          <p:nvPr/>
-        </p:nvSpPr>
-        <p:spPr>
-          <a:xfrm>
-            <a:off x="1065861" y="3183242"/>
-            <a:ext cx="987450" cy="369332"/>
-          </a:xfrm>
-          <a:prstGeom prst="rect">
-            <a:avLst/>
-          </a:prstGeom>
-          <a:noFill/>
-        </p:spPr>
-        <p:txBody>
-          <a:bodyPr wrap="none" rtlCol="0">
-            <a:spAutoFit/>
-          </a:bodyPr>
-          <a:lstStyle/>
-          <a:p>
-            <a:pPr algn="ctr"/>
-            <a:r>
-              <a:rPr lang="da-DK" b="1" smtClean="0"/>
-              <a:t>matches</a:t>
-            </a:r>
-            <a:endParaRPr lang="da-DK" b="1"/>
-          </a:p>
-        </p:txBody>
-      </p:sp>
-      <p:sp>
-        <p:nvSpPr>
-          <p:cNvPr id="39" name="Tekstfelt 38"/>
-          <p:cNvSpPr txBox="1"/>
-          <p:nvPr/>
-        </p:nvSpPr>
-        <p:spPr>
-          <a:xfrm>
-            <a:off x="1055178" y="2653143"/>
-            <a:ext cx="461986" cy="307777"/>
-          </a:xfrm>
-          <a:prstGeom prst="rect">
-            <a:avLst/>
-          </a:prstGeom>
-          <a:noFill/>
-        </p:spPr>
-        <p:txBody>
-          <a:bodyPr wrap="none" rtlCol="0">
-            <a:spAutoFit/>
-          </a:bodyPr>
-          <a:lstStyle/>
-          <a:p>
-            <a:r>
-              <a:rPr lang="da-DK" sz="1400" b="1" smtClean="0"/>
-              <a:t>0..*</a:t>
-            </a:r>
-            <a:endParaRPr lang="da-DK" sz="1400" b="1"/>
-          </a:p>
-        </p:txBody>
-      </p:sp>
-      <p:sp>
-        <p:nvSpPr>
-          <p:cNvPr id="40" name="Tekstfelt 39"/>
-          <p:cNvSpPr txBox="1"/>
-          <p:nvPr/>
-        </p:nvSpPr>
-        <p:spPr>
-          <a:xfrm>
-            <a:off x="1065861" y="3773534"/>
-            <a:ext cx="461986" cy="307777"/>
-          </a:xfrm>
-          <a:prstGeom prst="rect">
-            <a:avLst/>
-          </a:prstGeom>
-          <a:noFill/>
-        </p:spPr>
-        <p:txBody>
-          <a:bodyPr wrap="none" rtlCol="0">
-            <a:spAutoFit/>
-          </a:bodyPr>
-          <a:lstStyle/>
-          <a:p>
-            <a:r>
-              <a:rPr lang="da-DK" sz="1400" b="1" smtClean="0"/>
-              <a:t>0..*</a:t>
-            </a:r>
-            <a:endParaRPr lang="da-DK" sz="1400" b="1"/>
-          </a:p>
-        </p:txBody>
-      </p:sp>
-      <p:sp>
-        <p:nvSpPr>
-          <p:cNvPr id="19" name="Afrundet rektangel 18"/>
+              <a:t>JewelModel</a:t>
+            </a:r>
+          </a:p>
+          <a:p>
+            <a:r>
+              <a:rPr lang="da-DK" sz="1400"/>
+              <a:t>Name</a:t>
+            </a:r>
+          </a:p>
+          <a:p>
+            <a:r>
+              <a:rPr lang="da-DK" sz="1400"/>
+              <a:t>Rarity</a:t>
+            </a:r>
+          </a:p>
+          <a:p>
+            <a:r>
+              <a:rPr lang="da-DK" sz="1400"/>
+              <a:t>AddedDamage</a:t>
+            </a:r>
+          </a:p>
+        </p:txBody>
+      </p:sp>
+      <p:sp>
+        <p:nvSpPr>
+          <p:cNvPr id="13" name="Afrundet rektangel 12"/>
           <p:cNvSpPr/>
           <p:nvPr/>
         </p:nvSpPr>
         <p:spPr>
           <a:xfrm>
-            <a:off x="251664" y="4048224"/>
+            <a:off x="249187" y="367970"/>
             <a:ext cx="1746166" cy="2330033"/>
           </a:xfrm>
           <a:prstGeom prst="roundRect">
             <a:avLst/>
           </a:prstGeom>
           <a:solidFill>
-            <a:srgbClr val="7030A0"/>
+            <a:srgbClr val="0070C0"/>
           </a:solidFill>
         </p:spPr>
         <p:style>
@@ -7469,7 +7429,7 @@
                   <a:srgbClr val="FFFF00"/>
                 </a:solidFill>
               </a:rPr>
-              <a:t>JewelModel</a:t>
+              <a:t>WeaponModel</a:t>
             </a:r>
           </a:p>
           <a:p>
@@ -7481,33 +7441,193 @@
           <a:p>
             <a:r>
               <a:rPr lang="da-DK" sz="1400"/>
+              <a:t>Type</a:t>
+            </a:r>
+          </a:p>
+          <a:p>
+            <a:r>
+              <a:rPr lang="da-DK" sz="1400"/>
               <a:t>Rarity</a:t>
             </a:r>
           </a:p>
           <a:p>
             <a:r>
               <a:rPr lang="da-DK" sz="1400"/>
-              <a:t>AddedDamage</a:t>
-            </a:r>
-          </a:p>
-        </p:txBody>
-      </p:sp>
-      <p:sp>
-        <p:nvSpPr>
-          <p:cNvPr id="13" name="Afrundet rektangel 12"/>
+              <a:t>ItemLevel</a:t>
+            </a:r>
+          </a:p>
+          <a:p>
+            <a:r>
+              <a:rPr lang="da-DK" sz="1400"/>
+              <a:t>JewelSockets</a:t>
+            </a:r>
+          </a:p>
+          <a:p>
+            <a:r>
+              <a:rPr lang="da-DK" sz="1400"/>
+              <a:t>MinDamage</a:t>
+            </a:r>
+          </a:p>
+          <a:p>
+            <a:r>
+              <a:rPr lang="da-DK" sz="1400"/>
+              <a:t>MaxDamage</a:t>
+            </a:r>
+          </a:p>
+          <a:p>
+            <a:r>
+              <a:rPr lang="da-DK" sz="1400"/>
+              <a:t>TwoHanded</a:t>
+            </a:r>
+          </a:p>
+        </p:txBody>
+      </p:sp>
+      <p:cxnSp>
+        <p:nvCxnSpPr>
+          <p:cNvPr id="41" name="Lige forbindelse 40"/>
+          <p:cNvCxnSpPr/>
+          <p:nvPr/>
+        </p:nvCxnSpPr>
+        <p:spPr>
+          <a:xfrm>
+            <a:off x="5458753" y="2332801"/>
+            <a:ext cx="1718135" cy="0"/>
+          </a:xfrm>
+          <a:prstGeom prst="line">
+            <a:avLst/>
+          </a:prstGeom>
+        </p:spPr>
+        <p:style>
+          <a:lnRef idx="3">
+            <a:schemeClr val="dk1"/>
+          </a:lnRef>
+          <a:fillRef idx="0">
+            <a:schemeClr val="dk1"/>
+          </a:fillRef>
+          <a:effectRef idx="2">
+            <a:schemeClr val="dk1"/>
+          </a:effectRef>
+          <a:fontRef idx="minor">
+            <a:schemeClr val="tx1"/>
+          </a:fontRef>
+        </p:style>
+      </p:cxnSp>
+      <p:sp>
+        <p:nvSpPr>
+          <p:cNvPr id="42" name="Tekstfelt 41"/>
+          <p:cNvSpPr txBox="1"/>
+          <p:nvPr/>
+        </p:nvSpPr>
+        <p:spPr>
+          <a:xfrm>
+            <a:off x="5630593" y="2000321"/>
+            <a:ext cx="982513" cy="369332"/>
+          </a:xfrm>
+          <a:prstGeom prst="rect">
+            <a:avLst/>
+          </a:prstGeom>
+          <a:noFill/>
+        </p:spPr>
+        <p:txBody>
+          <a:bodyPr wrap="none" rtlCol="0">
+            <a:spAutoFit/>
+          </a:bodyPr>
+          <a:lstStyle/>
+          <a:p>
+            <a:r>
+              <a:rPr lang="da-DK" b="1" smtClean="0"/>
+              <a:t> </a:t>
+            </a:r>
+            <a:r>
+              <a:rPr lang="da-DK" b="1" smtClean="0">
+                <a:sym typeface="Wingdings" panose="05000000000000000000" pitchFamily="2" charset="2"/>
+              </a:rPr>
+              <a:t> </a:t>
+            </a:r>
+            <a:r>
+              <a:rPr lang="da-DK" b="1" smtClean="0"/>
+              <a:t>owns</a:t>
+            </a:r>
+            <a:endParaRPr lang="da-DK" b="1"/>
+          </a:p>
+        </p:txBody>
+      </p:sp>
+      <p:sp>
+        <p:nvSpPr>
+          <p:cNvPr id="43" name="Tekstfelt 42"/>
+          <p:cNvSpPr txBox="1"/>
+          <p:nvPr/>
+        </p:nvSpPr>
+        <p:spPr>
+          <a:xfrm>
+            <a:off x="5445474" y="2310708"/>
+            <a:ext cx="461986" cy="307777"/>
+          </a:xfrm>
+          <a:prstGeom prst="rect">
+            <a:avLst/>
+          </a:prstGeom>
+          <a:noFill/>
+        </p:spPr>
+        <p:txBody>
+          <a:bodyPr wrap="none" rtlCol="0">
+            <a:spAutoFit/>
+          </a:bodyPr>
+          <a:lstStyle/>
+          <a:p>
+            <a:r>
+              <a:rPr lang="da-DK" sz="1400" b="1" smtClean="0"/>
+              <a:t>0..*</a:t>
+            </a:r>
+            <a:endParaRPr lang="da-DK" sz="1400" b="1"/>
+          </a:p>
+        </p:txBody>
+      </p:sp>
+      <p:sp>
+        <p:nvSpPr>
+          <p:cNvPr id="44" name="Tekstfelt 43"/>
+          <p:cNvSpPr txBox="1"/>
+          <p:nvPr/>
+        </p:nvSpPr>
+        <p:spPr>
+          <a:xfrm>
+            <a:off x="6761980" y="2310708"/>
+            <a:ext cx="463588" cy="307777"/>
+          </a:xfrm>
+          <a:prstGeom prst="rect">
+            <a:avLst/>
+          </a:prstGeom>
+          <a:noFill/>
+        </p:spPr>
+        <p:txBody>
+          <a:bodyPr wrap="none" rtlCol="0">
+            <a:spAutoFit/>
+          </a:bodyPr>
+          <a:lstStyle/>
+          <a:p>
+            <a:r>
+              <a:rPr lang="da-DK" sz="1400" b="1" smtClean="0"/>
+              <a:t>0..1</a:t>
+            </a:r>
+            <a:endParaRPr lang="da-DK" sz="1400" b="1"/>
+          </a:p>
+        </p:txBody>
+      </p:sp>
+      <p:sp>
+        <p:nvSpPr>
+          <p:cNvPr id="11" name="Afrundet rektangel 10"/>
           <p:cNvSpPr/>
           <p:nvPr/>
         </p:nvSpPr>
         <p:spPr>
           <a:xfrm>
-            <a:off x="249187" y="367970"/>
-            <a:ext cx="1746166" cy="2330033"/>
+            <a:off x="7177789" y="357562"/>
+            <a:ext cx="1746166" cy="2330032"/>
           </a:xfrm>
           <a:prstGeom prst="roundRect">
             <a:avLst/>
           </a:prstGeom>
           <a:solidFill>
-            <a:srgbClr val="0070C0"/>
+            <a:srgbClr val="C00000"/>
           </a:solidFill>
         </p:spPr>
         <p:style>
@@ -7537,7 +7657,7 @@
                   <a:srgbClr val="FFFF00"/>
                 </a:solidFill>
               </a:rPr>
-              <a:t>WeaponModel</a:t>
+              <a:t>Character</a:t>
             </a:r>
           </a:p>
           <a:p>
@@ -7549,194 +7669,41 @@
           <a:p>
             <a:r>
               <a:rPr lang="da-DK" sz="1400"/>
-              <a:t>Type</a:t>
+              <a:t>Race</a:t>
             </a:r>
           </a:p>
           <a:p>
             <a:r>
               <a:rPr lang="da-DK" sz="1400"/>
-              <a:t>Rarity</a:t>
+              <a:t>Class</a:t>
             </a:r>
           </a:p>
           <a:p>
             <a:r>
               <a:rPr lang="da-DK" sz="1400"/>
-              <a:t>ItemLevel</a:t>
-            </a:r>
-          </a:p>
-          <a:p>
-            <a:r>
-              <a:rPr lang="da-DK" sz="1400"/>
-              <a:t>JewelSockets</a:t>
-            </a:r>
-          </a:p>
-          <a:p>
-            <a:r>
-              <a:rPr lang="da-DK" sz="1400"/>
-              <a:t>MinDamage</a:t>
-            </a:r>
-          </a:p>
-          <a:p>
-            <a:r>
-              <a:rPr lang="da-DK" sz="1400"/>
-              <a:t>MaxDamage</a:t>
-            </a:r>
-          </a:p>
-          <a:p>
-            <a:r>
-              <a:rPr lang="da-DK" sz="1400"/>
-              <a:t>TwoHanded</a:t>
-            </a:r>
-            <a:endParaRPr lang="da-DK" sz="1400"/>
-          </a:p>
-        </p:txBody>
-      </p:sp>
-      <p:cxnSp>
-        <p:nvCxnSpPr>
-          <p:cNvPr id="41" name="Lige forbindelse 40"/>
-          <p:cNvCxnSpPr/>
-          <p:nvPr/>
-        </p:nvCxnSpPr>
-        <p:spPr>
-          <a:xfrm>
-            <a:off x="5458753" y="2332801"/>
-            <a:ext cx="1718135" cy="0"/>
-          </a:xfrm>
-          <a:prstGeom prst="line">
-            <a:avLst/>
-          </a:prstGeom>
-        </p:spPr>
-        <p:style>
-          <a:lnRef idx="3">
-            <a:schemeClr val="dk1"/>
-          </a:lnRef>
-          <a:fillRef idx="0">
-            <a:schemeClr val="dk1"/>
-          </a:fillRef>
-          <a:effectRef idx="2">
-            <a:schemeClr val="dk1"/>
-          </a:effectRef>
-          <a:fontRef idx="minor">
-            <a:schemeClr val="tx1"/>
-          </a:fontRef>
-        </p:style>
-      </p:cxnSp>
-      <p:sp>
-        <p:nvSpPr>
-          <p:cNvPr id="42" name="Tekstfelt 41"/>
-          <p:cNvSpPr txBox="1"/>
-          <p:nvPr/>
-        </p:nvSpPr>
-        <p:spPr>
-          <a:xfrm>
-            <a:off x="5630593" y="2000321"/>
-            <a:ext cx="982513" cy="369332"/>
-          </a:xfrm>
-          <a:prstGeom prst="rect">
-            <a:avLst/>
-          </a:prstGeom>
-          <a:noFill/>
-        </p:spPr>
-        <p:txBody>
-          <a:bodyPr wrap="none" rtlCol="0">
-            <a:spAutoFit/>
-          </a:bodyPr>
-          <a:lstStyle/>
-          <a:p>
-            <a:r>
-              <a:rPr lang="da-DK" b="1" smtClean="0"/>
-              <a:t> </a:t>
-            </a:r>
-            <a:r>
-              <a:rPr lang="da-DK" b="1" smtClean="0">
-                <a:sym typeface="Wingdings" panose="05000000000000000000" pitchFamily="2" charset="2"/>
-              </a:rPr>
-              <a:t> </a:t>
-            </a:r>
-            <a:r>
-              <a:rPr lang="da-DK" b="1" smtClean="0"/>
-              <a:t>owns</a:t>
-            </a:r>
-            <a:endParaRPr lang="da-DK" b="1"/>
-          </a:p>
-        </p:txBody>
-      </p:sp>
-      <p:sp>
-        <p:nvSpPr>
-          <p:cNvPr id="43" name="Tekstfelt 42"/>
-          <p:cNvSpPr txBox="1"/>
-          <p:nvPr/>
-        </p:nvSpPr>
-        <p:spPr>
-          <a:xfrm>
-            <a:off x="5445474" y="2310708"/>
-            <a:ext cx="461986" cy="307777"/>
-          </a:xfrm>
-          <a:prstGeom prst="rect">
-            <a:avLst/>
-          </a:prstGeom>
-          <a:noFill/>
-        </p:spPr>
-        <p:txBody>
-          <a:bodyPr wrap="none" rtlCol="0">
-            <a:spAutoFit/>
-          </a:bodyPr>
-          <a:lstStyle/>
-          <a:p>
-            <a:r>
-              <a:rPr lang="da-DK" sz="1400" b="1" smtClean="0"/>
-              <a:t>0..*</a:t>
-            </a:r>
-            <a:endParaRPr lang="da-DK" sz="1400" b="1"/>
-          </a:p>
-        </p:txBody>
-      </p:sp>
-      <p:sp>
-        <p:nvSpPr>
-          <p:cNvPr id="44" name="Tekstfelt 43"/>
-          <p:cNvSpPr txBox="1"/>
-          <p:nvPr/>
-        </p:nvSpPr>
-        <p:spPr>
-          <a:xfrm>
-            <a:off x="6761980" y="2310708"/>
-            <a:ext cx="463588" cy="307777"/>
-          </a:xfrm>
-          <a:prstGeom prst="rect">
-            <a:avLst/>
-          </a:prstGeom>
-          <a:noFill/>
-        </p:spPr>
-        <p:txBody>
-          <a:bodyPr wrap="none" rtlCol="0">
-            <a:spAutoFit/>
-          </a:bodyPr>
-          <a:lstStyle/>
-          <a:p>
-            <a:r>
-              <a:rPr lang="da-DK" sz="1400" b="1" smtClean="0"/>
-              <a:t>0..1</a:t>
-            </a:r>
-            <a:endParaRPr lang="da-DK" sz="1400" b="1"/>
-          </a:p>
-        </p:txBody>
-      </p:sp>
-      <p:sp>
-        <p:nvSpPr>
-          <p:cNvPr id="11" name="Afrundet rektangel 10"/>
+              <a:t>HealthPoints</a:t>
+            </a:r>
+          </a:p>
+        </p:txBody>
+      </p:sp>
+      <p:sp>
+        <p:nvSpPr>
+          <p:cNvPr id="9" name="Afrundet rektangel 8"/>
           <p:cNvSpPr/>
           <p:nvPr/>
         </p:nvSpPr>
         <p:spPr>
           <a:xfrm>
-            <a:off x="7177789" y="357562"/>
-            <a:ext cx="1746166" cy="2330032"/>
+            <a:off x="3713488" y="357561"/>
+            <a:ext cx="1746166" cy="2330033"/>
           </a:xfrm>
           <a:prstGeom prst="roundRect">
             <a:avLst/>
           </a:prstGeom>
           <a:solidFill>
-            <a:srgbClr val="C00000"/>
+            <a:schemeClr val="accent6">
+              <a:lumMod val="75000"/>
+            </a:schemeClr>
           </a:solidFill>
         </p:spPr>
         <p:style>
@@ -7766,54 +7733,187 @@
                   <a:srgbClr val="FFFF00"/>
                 </a:solidFill>
               </a:rPr>
-              <a:t>Character</a:t>
-            </a:r>
-          </a:p>
-          <a:p>
-            <a:r>
-              <a:rPr lang="da-DK" sz="1400"/>
-              <a:t>Name</a:t>
-            </a:r>
-          </a:p>
-          <a:p>
-            <a:r>
-              <a:rPr lang="da-DK" sz="1400"/>
-              <a:t>Race</a:t>
-            </a:r>
-          </a:p>
-          <a:p>
-            <a:r>
-              <a:rPr lang="da-DK" sz="1400"/>
-              <a:t>Class</a:t>
-            </a:r>
-          </a:p>
-          <a:p>
-            <a:r>
-              <a:rPr lang="da-DK" sz="1400"/>
-              <a:t>HealthPoints</a:t>
-            </a:r>
-            <a:endParaRPr lang="da-DK" sz="1400"/>
-          </a:p>
-        </p:txBody>
-      </p:sp>
-      <p:sp>
-        <p:nvSpPr>
-          <p:cNvPr id="9" name="Afrundet rektangel 8"/>
+              <a:t>Weapon</a:t>
+            </a:r>
+          </a:p>
+        </p:txBody>
+      </p:sp>
+      <p:sp>
+        <p:nvSpPr>
+          <p:cNvPr id="45" name="Tekstfelt 44"/>
+          <p:cNvSpPr txBox="1"/>
+          <p:nvPr/>
+        </p:nvSpPr>
+        <p:spPr>
+          <a:xfrm>
+            <a:off x="10467474" y="5751094"/>
+            <a:ext cx="1258678" cy="369332"/>
+          </a:xfrm>
+          <a:prstGeom prst="rect">
+            <a:avLst/>
+          </a:prstGeom>
+          <a:noFill/>
+        </p:spPr>
+        <p:txBody>
+          <a:bodyPr wrap="none" rtlCol="0">
+            <a:spAutoFit/>
+          </a:bodyPr>
+          <a:lstStyle/>
+          <a:p>
+            <a:r>
+              <a:rPr lang="da-DK" smtClean="0"/>
+              <a:t>DBDesign.6</a:t>
+            </a:r>
+            <a:endParaRPr lang="da-DK"/>
+          </a:p>
+        </p:txBody>
+      </p:sp>
+      <p:cxnSp>
+        <p:nvCxnSpPr>
+          <p:cNvPr id="47" name="Lige forbindelse 46"/>
+          <p:cNvCxnSpPr/>
+          <p:nvPr/>
+        </p:nvCxnSpPr>
+        <p:spPr>
+          <a:xfrm>
+            <a:off x="5472032" y="5152041"/>
+            <a:ext cx="1718135" cy="0"/>
+          </a:xfrm>
+          <a:prstGeom prst="line">
+            <a:avLst/>
+          </a:prstGeom>
+        </p:spPr>
+        <p:style>
+          <a:lnRef idx="3">
+            <a:schemeClr val="dk1"/>
+          </a:lnRef>
+          <a:fillRef idx="0">
+            <a:schemeClr val="dk1"/>
+          </a:fillRef>
+          <a:effectRef idx="2">
+            <a:schemeClr val="dk1"/>
+          </a:effectRef>
+          <a:fontRef idx="minor">
+            <a:schemeClr val="tx1"/>
+          </a:fontRef>
+        </p:style>
+      </p:cxnSp>
+      <p:sp>
+        <p:nvSpPr>
+          <p:cNvPr id="48" name="Tekstfelt 47"/>
+          <p:cNvSpPr txBox="1"/>
+          <p:nvPr/>
+        </p:nvSpPr>
+        <p:spPr>
+          <a:xfrm>
+            <a:off x="5643872" y="4819561"/>
+            <a:ext cx="801823" cy="369332"/>
+          </a:xfrm>
+          <a:prstGeom prst="rect">
+            <a:avLst/>
+          </a:prstGeom>
+          <a:noFill/>
+        </p:spPr>
+        <p:txBody>
+          <a:bodyPr wrap="none" rtlCol="0">
+            <a:spAutoFit/>
+          </a:bodyPr>
+          <a:lstStyle/>
+          <a:p>
+            <a:r>
+              <a:rPr lang="da-DK" b="1" smtClean="0"/>
+              <a:t> </a:t>
+            </a:r>
+            <a:r>
+              <a:rPr lang="da-DK" b="1" smtClean="0">
+                <a:sym typeface="Wingdings" panose="05000000000000000000" pitchFamily="2" charset="2"/>
+              </a:rPr>
+              <a:t> </a:t>
+            </a:r>
+            <a:r>
+              <a:rPr lang="da-DK" b="1" smtClean="0"/>
+              <a:t>has</a:t>
+            </a:r>
+            <a:endParaRPr lang="da-DK" b="1"/>
+          </a:p>
+        </p:txBody>
+      </p:sp>
+      <p:sp>
+        <p:nvSpPr>
+          <p:cNvPr id="49" name="Tekstfelt 48"/>
+          <p:cNvSpPr txBox="1"/>
+          <p:nvPr/>
+        </p:nvSpPr>
+        <p:spPr>
+          <a:xfrm>
+            <a:off x="5458753" y="5129948"/>
+            <a:ext cx="461986" cy="307777"/>
+          </a:xfrm>
+          <a:prstGeom prst="rect">
+            <a:avLst/>
+          </a:prstGeom>
+          <a:noFill/>
+        </p:spPr>
+        <p:txBody>
+          <a:bodyPr wrap="none" rtlCol="0">
+            <a:spAutoFit/>
+          </a:bodyPr>
+          <a:lstStyle/>
+          <a:p>
+            <a:r>
+              <a:rPr lang="da-DK" sz="1400" b="1" smtClean="0"/>
+              <a:t>0..*</a:t>
+            </a:r>
+            <a:endParaRPr lang="da-DK" sz="1400" b="1"/>
+          </a:p>
+        </p:txBody>
+      </p:sp>
+      <p:sp>
+        <p:nvSpPr>
+          <p:cNvPr id="50" name="Tekstfelt 49"/>
+          <p:cNvSpPr txBox="1"/>
+          <p:nvPr/>
+        </p:nvSpPr>
+        <p:spPr>
+          <a:xfrm>
+            <a:off x="6887801" y="5129948"/>
+            <a:ext cx="276038" cy="307777"/>
+          </a:xfrm>
+          <a:prstGeom prst="rect">
+            <a:avLst/>
+          </a:prstGeom>
+          <a:noFill/>
+        </p:spPr>
+        <p:txBody>
+          <a:bodyPr wrap="none" rtlCol="0">
+            <a:spAutoFit/>
+          </a:bodyPr>
+          <a:lstStyle/>
+          <a:p>
+            <a:r>
+              <a:rPr lang="da-DK" sz="1400" b="1" smtClean="0"/>
+              <a:t>1</a:t>
+            </a:r>
+            <a:endParaRPr lang="da-DK" sz="1400" b="1"/>
+          </a:p>
+        </p:txBody>
+      </p:sp>
+      <p:sp>
+        <p:nvSpPr>
+          <p:cNvPr id="46" name="Afrundet rektangel 45"/>
           <p:cNvSpPr/>
           <p:nvPr/>
         </p:nvSpPr>
         <p:spPr>
           <a:xfrm>
-            <a:off x="3713488" y="357561"/>
+            <a:off x="7176888" y="4060344"/>
             <a:ext cx="1746166" cy="2330033"/>
           </a:xfrm>
           <a:prstGeom prst="roundRect">
             <a:avLst/>
           </a:prstGeom>
           <a:solidFill>
-            <a:schemeClr val="accent6">
-              <a:lumMod val="75000"/>
-            </a:schemeClr>
+            <a:srgbClr val="002060"/>
           </a:solidFill>
         </p:spPr>
         <p:style>
@@ -7838,43 +7938,100 @@
           <a:p>
             <a:pPr algn="ctr"/>
             <a:r>
+              <a:rPr lang="da-DK" sz="1600" smtClean="0">
+                <a:solidFill>
+                  <a:srgbClr val="FFFF00"/>
+                </a:solidFill>
+              </a:rPr>
+              <a:t>JewelCutQuality</a:t>
+            </a:r>
+            <a:endParaRPr lang="da-DK" sz="1600" smtClean="0">
+              <a:solidFill>
+                <a:srgbClr val="FFFF00"/>
+              </a:solidFill>
+            </a:endParaRPr>
+          </a:p>
+          <a:p>
+            <a:r>
+              <a:rPr lang="da-DK" sz="1400" smtClean="0">
+                <a:solidFill>
+                  <a:schemeClr val="bg1"/>
+                </a:solidFill>
+              </a:rPr>
+              <a:t>CutQuality</a:t>
+            </a:r>
+          </a:p>
+          <a:p>
+            <a:r>
+              <a:rPr lang="da-DK" sz="1400" smtClean="0">
+                <a:solidFill>
+                  <a:schemeClr val="bg1"/>
+                </a:solidFill>
+              </a:rPr>
+              <a:t>Factor</a:t>
+            </a:r>
+            <a:endParaRPr lang="da-DK" sz="1400" smtClean="0">
+              <a:solidFill>
+                <a:schemeClr val="bg1"/>
+              </a:solidFill>
+            </a:endParaRPr>
+          </a:p>
+        </p:txBody>
+      </p:sp>
+      <p:sp>
+        <p:nvSpPr>
+          <p:cNvPr id="20" name="Afrundet rektangel 19"/>
+          <p:cNvSpPr/>
+          <p:nvPr/>
+        </p:nvSpPr>
+        <p:spPr>
+          <a:xfrm>
+            <a:off x="3721366" y="4048223"/>
+            <a:ext cx="1746166" cy="2330033"/>
+          </a:xfrm>
+          <a:prstGeom prst="roundRect">
+            <a:avLst/>
+          </a:prstGeom>
+          <a:solidFill>
+            <a:srgbClr val="002060"/>
+          </a:solidFill>
+        </p:spPr>
+        <p:style>
+          <a:lnRef idx="2">
+            <a:schemeClr val="accent1">
+              <a:shade val="50000"/>
+            </a:schemeClr>
+          </a:lnRef>
+          <a:fillRef idx="1">
+            <a:schemeClr val="accent1"/>
+          </a:fillRef>
+          <a:effectRef idx="0">
+            <a:schemeClr val="accent1"/>
+          </a:effectRef>
+          <a:fontRef idx="minor">
+            <a:schemeClr val="lt1"/>
+          </a:fontRef>
+        </p:style>
+        <p:txBody>
+          <a:bodyPr rtlCol="0" anchor="t"/>
+          <a:lstStyle/>
+          <a:p>
+            <a:pPr algn="ctr"/>
+            <a:r>
               <a:rPr lang="da-DK" smtClean="0">
                 <a:solidFill>
                   <a:srgbClr val="FFFF00"/>
                 </a:solidFill>
               </a:rPr>
-              <a:t>Weapon</a:t>
-            </a:r>
-          </a:p>
-        </p:txBody>
-      </p:sp>
-      <p:sp>
-        <p:nvSpPr>
-          <p:cNvPr id="45" name="Tekstfelt 44"/>
-          <p:cNvSpPr txBox="1"/>
-          <p:nvPr/>
-        </p:nvSpPr>
-        <p:spPr>
-          <a:xfrm>
-            <a:off x="10467474" y="5751094"/>
-            <a:ext cx="1258678" cy="369332"/>
-          </a:xfrm>
-          <a:prstGeom prst="rect">
-            <a:avLst/>
-          </a:prstGeom>
-          <a:noFill/>
-        </p:spPr>
-        <p:txBody>
-          <a:bodyPr wrap="none" rtlCol="0">
-            <a:spAutoFit/>
-          </a:bodyPr>
-          <a:lstStyle/>
-          <a:p>
-            <a:r>
-              <a:rPr lang="da-DK" smtClean="0"/>
-              <a:t>DBDesign.6</a:t>
-            </a:r>
-            <a:endParaRPr lang="da-DK"/>
+              <a:t>Jewel</a:t>
+            </a:r>
+          </a:p>
+          <a:p>
+            <a:endParaRPr lang="da-DK" sz="1400" smtClean="0">
+              <a:solidFill>
+                <a:schemeClr val="bg1"/>
+              </a:solidFill>
+            </a:endParaRPr>
           </a:p>
         </p:txBody>
       </p:sp>
@@ -8319,7 +8476,6 @@
               <a:rPr lang="da-DK" sz="1600" smtClean="0"/>
               <a:t>ame</a:t>
             </a:r>
-            <a:endParaRPr lang="da-DK" sz="1600" smtClean="0"/>
           </a:p>
           <a:p>
             <a:r>
@@ -8330,7 +8486,6 @@
               <a:rPr lang="da-DK" sz="1600" smtClean="0"/>
               <a:t>ector</a:t>
             </a:r>
-            <a:endParaRPr lang="da-DK" sz="1600" smtClean="0"/>
           </a:p>
         </p:txBody>
       </p:sp>
@@ -8391,7 +8546,6 @@
               <a:rPr lang="da-DK" sz="1600" smtClean="0"/>
               <a:t>ame</a:t>
             </a:r>
-            <a:endParaRPr lang="da-DK" sz="1600" smtClean="0"/>
           </a:p>
           <a:p>
             <a:r>
@@ -8402,18 +8556,12 @@
               <a:rPr lang="da-DK" sz="1600" smtClean="0"/>
               <a:t>ector</a:t>
             </a:r>
-            <a:endParaRPr lang="da-DK" sz="1600" smtClean="0"/>
           </a:p>
           <a:p>
             <a:r>
               <a:rPr lang="da-DK" sz="1600" smtClean="0"/>
-              <a:t>N</a:t>
-            </a:r>
-            <a:r>
-              <a:rPr lang="da-DK" sz="1600" smtClean="0"/>
-              <a:t>oOfEmployees</a:t>
-            </a:r>
-            <a:endParaRPr lang="da-DK" sz="1600" smtClean="0"/>
+              <a:t>NoOfEmployees</a:t>
+            </a:r>
           </a:p>
         </p:txBody>
       </p:sp>

</xml_diff>